<commit_message>
sudah selesai fitur peminjam dan admin
</commit_message>
<xml_diff>
--- a/perlengkapan/Prototype peminjaman alat.pptx
+++ b/perlengkapan/Prototype peminjaman alat.pptx
@@ -5,20 +5,22 @@
     <p:sldMasterId id="2147483648" r:id="rId1"/>
   </p:sldMasterIdLst>
   <p:notesMasterIdLst>
-    <p:notesMasterId r:id="rId13"/>
+    <p:notesMasterId r:id="rId15"/>
   </p:notesMasterIdLst>
   <p:sldIdLst>
     <p:sldId id="303" r:id="rId2"/>
-    <p:sldId id="306" r:id="rId3"/>
-    <p:sldId id="305" r:id="rId4"/>
-    <p:sldId id="304" r:id="rId5"/>
-    <p:sldId id="273" r:id="rId6"/>
-    <p:sldId id="301" r:id="rId7"/>
-    <p:sldId id="300" r:id="rId8"/>
-    <p:sldId id="299" r:id="rId9"/>
-    <p:sldId id="271" r:id="rId10"/>
-    <p:sldId id="263" r:id="rId11"/>
-    <p:sldId id="302" r:id="rId12"/>
+    <p:sldId id="308" r:id="rId3"/>
+    <p:sldId id="307" r:id="rId4"/>
+    <p:sldId id="306" r:id="rId5"/>
+    <p:sldId id="305" r:id="rId6"/>
+    <p:sldId id="304" r:id="rId7"/>
+    <p:sldId id="273" r:id="rId8"/>
+    <p:sldId id="301" r:id="rId9"/>
+    <p:sldId id="300" r:id="rId10"/>
+    <p:sldId id="299" r:id="rId11"/>
+    <p:sldId id="271" r:id="rId12"/>
+    <p:sldId id="263" r:id="rId13"/>
+    <p:sldId id="302" r:id="rId14"/>
   </p:sldIdLst>
   <p:sldSz cx="12192000" cy="6858000"/>
   <p:notesSz cx="6858000" cy="9144000"/>
@@ -207,7 +209,7 @@
           <a:p>
             <a:fld id="{355C5232-37C6-4E6A-90C1-0FFEE7DE1D89}" type="datetimeFigureOut">
               <a:rPr lang="en-US" smtClean="0"/>
-              <a:t>11/21/2025</a:t>
+              <a:t>11/22/2025</a:t>
             </a:fld>
             <a:endParaRPr lang="en-US"/>
           </a:p>
@@ -539,7 +541,7 @@
           <a:p>
             <a:fld id="{70E1CBBE-7A89-4A0C-BDED-306C13EFE26F}" type="slidenum">
               <a:rPr lang="en-US" smtClean="0"/>
-              <a:t>10</a:t>
+              <a:t>12</a:t>
             </a:fld>
             <a:endParaRPr lang="en-US"/>
           </a:p>
@@ -623,7 +625,7 @@
           <a:p>
             <a:fld id="{70E1CBBE-7A89-4A0C-BDED-306C13EFE26F}" type="slidenum">
               <a:rPr lang="en-US" smtClean="0"/>
-              <a:t>11</a:t>
+              <a:t>13</a:t>
             </a:fld>
             <a:endParaRPr lang="en-US"/>
           </a:p>
@@ -789,7 +791,7 @@
           <a:p>
             <a:fld id="{A34D38E4-6B21-4E99-BB2B-D81E1D56BAB8}" type="datetimeFigureOut">
               <a:rPr lang="en-US" smtClean="0"/>
-              <a:t>11/21/2025</a:t>
+              <a:t>11/22/2025</a:t>
             </a:fld>
             <a:endParaRPr lang="en-US"/>
           </a:p>
@@ -987,7 +989,7 @@
           <a:p>
             <a:fld id="{A34D38E4-6B21-4E99-BB2B-D81E1D56BAB8}" type="datetimeFigureOut">
               <a:rPr lang="en-US" smtClean="0"/>
-              <a:t>11/21/2025</a:t>
+              <a:t>11/22/2025</a:t>
             </a:fld>
             <a:endParaRPr lang="en-US"/>
           </a:p>
@@ -1195,7 +1197,7 @@
           <a:p>
             <a:fld id="{A34D38E4-6B21-4E99-BB2B-D81E1D56BAB8}" type="datetimeFigureOut">
               <a:rPr lang="en-US" smtClean="0"/>
-              <a:t>11/21/2025</a:t>
+              <a:t>11/22/2025</a:t>
             </a:fld>
             <a:endParaRPr lang="en-US"/>
           </a:p>
@@ -1393,7 +1395,7 @@
           <a:p>
             <a:fld id="{A34D38E4-6B21-4E99-BB2B-D81E1D56BAB8}" type="datetimeFigureOut">
               <a:rPr lang="en-US" smtClean="0"/>
-              <a:t>11/21/2025</a:t>
+              <a:t>11/22/2025</a:t>
             </a:fld>
             <a:endParaRPr lang="en-US"/>
           </a:p>
@@ -1668,7 +1670,7 @@
           <a:p>
             <a:fld id="{A34D38E4-6B21-4E99-BB2B-D81E1D56BAB8}" type="datetimeFigureOut">
               <a:rPr lang="en-US" smtClean="0"/>
-              <a:t>11/21/2025</a:t>
+              <a:t>11/22/2025</a:t>
             </a:fld>
             <a:endParaRPr lang="en-US"/>
           </a:p>
@@ -1933,7 +1935,7 @@
           <a:p>
             <a:fld id="{A34D38E4-6B21-4E99-BB2B-D81E1D56BAB8}" type="datetimeFigureOut">
               <a:rPr lang="en-US" smtClean="0"/>
-              <a:t>11/21/2025</a:t>
+              <a:t>11/22/2025</a:t>
             </a:fld>
             <a:endParaRPr lang="en-US"/>
           </a:p>
@@ -2345,7 +2347,7 @@
           <a:p>
             <a:fld id="{A34D38E4-6B21-4E99-BB2B-D81E1D56BAB8}" type="datetimeFigureOut">
               <a:rPr lang="en-US" smtClean="0"/>
-              <a:t>11/21/2025</a:t>
+              <a:t>11/22/2025</a:t>
             </a:fld>
             <a:endParaRPr lang="en-US"/>
           </a:p>
@@ -2486,7 +2488,7 @@
           <a:p>
             <a:fld id="{A34D38E4-6B21-4E99-BB2B-D81E1D56BAB8}" type="datetimeFigureOut">
               <a:rPr lang="en-US" smtClean="0"/>
-              <a:t>11/21/2025</a:t>
+              <a:t>11/22/2025</a:t>
             </a:fld>
             <a:endParaRPr lang="en-US"/>
           </a:p>
@@ -2599,7 +2601,7 @@
           <a:p>
             <a:fld id="{A34D38E4-6B21-4E99-BB2B-D81E1D56BAB8}" type="datetimeFigureOut">
               <a:rPr lang="en-US" smtClean="0"/>
-              <a:t>11/21/2025</a:t>
+              <a:t>11/22/2025</a:t>
             </a:fld>
             <a:endParaRPr lang="en-US"/>
           </a:p>
@@ -2910,7 +2912,7 @@
           <a:p>
             <a:fld id="{A34D38E4-6B21-4E99-BB2B-D81E1D56BAB8}" type="datetimeFigureOut">
               <a:rPr lang="en-US" smtClean="0"/>
-              <a:t>11/21/2025</a:t>
+              <a:t>11/22/2025</a:t>
             </a:fld>
             <a:endParaRPr lang="en-US"/>
           </a:p>
@@ -3198,7 +3200,7 @@
           <a:p>
             <a:fld id="{A34D38E4-6B21-4E99-BB2B-D81E1D56BAB8}" type="datetimeFigureOut">
               <a:rPr lang="en-US" smtClean="0"/>
-              <a:t>11/21/2025</a:t>
+              <a:t>11/22/2025</a:t>
             </a:fld>
             <a:endParaRPr lang="en-US"/>
           </a:p>
@@ -3439,7 +3441,7 @@
           <a:p>
             <a:fld id="{A34D38E4-6B21-4E99-BB2B-D81E1D56BAB8}" type="datetimeFigureOut">
               <a:rPr lang="en-US" smtClean="0"/>
-              <a:t>11/21/2025</a:t>
+              <a:t>11/22/2025</a:t>
             </a:fld>
             <a:endParaRPr lang="en-US"/>
           </a:p>
@@ -3864,6 +3866,2487 @@
       </p:grpSpPr>
       <p:pic>
         <p:nvPicPr>
+          <p:cNvPr id="10" name="Picture 9">
+            <a:extLst>
+              <a:ext uri="{FF2B5EF4-FFF2-40B4-BE49-F238E27FC236}">
+                <a16:creationId xmlns:a16="http://schemas.microsoft.com/office/drawing/2014/main" id="{79C0E7ED-3619-3604-634E-9C5B9D9DE52E}"/>
+              </a:ext>
+            </a:extLst>
+          </p:cNvPr>
+          <p:cNvPicPr>
+            <a:picLocks noChangeAspect="1"/>
+          </p:cNvPicPr>
+          <p:nvPr/>
+        </p:nvPicPr>
+        <p:blipFill>
+          <a:blip r:embed="rId2"/>
+          <a:stretch>
+            <a:fillRect/>
+          </a:stretch>
+        </p:blipFill>
+        <p:spPr>
+          <a:xfrm>
+            <a:off x="2543792" y="1534828"/>
+            <a:ext cx="7364098" cy="1837379"/>
+          </a:xfrm>
+          <a:prstGeom prst="rect">
+            <a:avLst/>
+          </a:prstGeom>
+        </p:spPr>
+      </p:pic>
+      <p:pic>
+        <p:nvPicPr>
+          <p:cNvPr id="12" name="Picture 11">
+            <a:extLst>
+              <a:ext uri="{FF2B5EF4-FFF2-40B4-BE49-F238E27FC236}">
+                <a16:creationId xmlns:a16="http://schemas.microsoft.com/office/drawing/2014/main" id="{BB6E76A6-9A00-6496-0EBE-70C2DAA802E9}"/>
+              </a:ext>
+            </a:extLst>
+          </p:cNvPr>
+          <p:cNvPicPr>
+            <a:picLocks noChangeAspect="1"/>
+          </p:cNvPicPr>
+          <p:nvPr/>
+        </p:nvPicPr>
+        <p:blipFill>
+          <a:blip r:embed="rId3"/>
+          <a:stretch>
+            <a:fillRect/>
+          </a:stretch>
+        </p:blipFill>
+        <p:spPr>
+          <a:xfrm>
+            <a:off x="1608915" y="795025"/>
+            <a:ext cx="9493405" cy="837130"/>
+          </a:xfrm>
+          <a:prstGeom prst="rect">
+            <a:avLst/>
+          </a:prstGeom>
+        </p:spPr>
+      </p:pic>
+      <p:pic>
+        <p:nvPicPr>
+          <p:cNvPr id="14" name="Picture 13">
+            <a:extLst>
+              <a:ext uri="{FF2B5EF4-FFF2-40B4-BE49-F238E27FC236}">
+                <a16:creationId xmlns:a16="http://schemas.microsoft.com/office/drawing/2014/main" id="{06225110-4849-31D7-B0D1-F769410AE8F0}"/>
+              </a:ext>
+            </a:extLst>
+          </p:cNvPr>
+          <p:cNvPicPr>
+            <a:picLocks noChangeAspect="1"/>
+          </p:cNvPicPr>
+          <p:nvPr/>
+        </p:nvPicPr>
+        <p:blipFill>
+          <a:blip r:embed="rId4"/>
+          <a:stretch>
+            <a:fillRect/>
+          </a:stretch>
+        </p:blipFill>
+        <p:spPr>
+          <a:xfrm>
+            <a:off x="2235926" y="845205"/>
+            <a:ext cx="905002" cy="247685"/>
+          </a:xfrm>
+          <a:prstGeom prst="rect">
+            <a:avLst/>
+          </a:prstGeom>
+        </p:spPr>
+      </p:pic>
+      <p:sp>
+        <p:nvSpPr>
+          <p:cNvPr id="17" name="Rectangle: Rounded Corners 16">
+            <a:extLst>
+              <a:ext uri="{FF2B5EF4-FFF2-40B4-BE49-F238E27FC236}">
+                <a16:creationId xmlns:a16="http://schemas.microsoft.com/office/drawing/2014/main" id="{2171D0D2-7F28-5442-AFAC-A7F73772B9B7}"/>
+              </a:ext>
+            </a:extLst>
+          </p:cNvPr>
+          <p:cNvSpPr/>
+          <p:nvPr/>
+        </p:nvSpPr>
+        <p:spPr>
+          <a:xfrm>
+            <a:off x="6749051" y="3701776"/>
+            <a:ext cx="4864573" cy="284020"/>
+          </a:xfrm>
+          <a:prstGeom prst="roundRect">
+            <a:avLst/>
+          </a:prstGeom>
+          <a:solidFill>
+            <a:srgbClr val="FF0000"/>
+          </a:solidFill>
+          <a:ln>
+            <a:noFill/>
+          </a:ln>
+        </p:spPr>
+        <p:style>
+          <a:lnRef idx="2">
+            <a:schemeClr val="accent1">
+              <a:shade val="15000"/>
+            </a:schemeClr>
+          </a:lnRef>
+          <a:fillRef idx="1">
+            <a:schemeClr val="accent1"/>
+          </a:fillRef>
+          <a:effectRef idx="0">
+            <a:schemeClr val="accent1"/>
+          </a:effectRef>
+          <a:fontRef idx="minor">
+            <a:schemeClr val="lt1"/>
+          </a:fontRef>
+        </p:style>
+        <p:txBody>
+          <a:bodyPr rtlCol="0" anchor="ctr"/>
+          <a:lstStyle/>
+          <a:p>
+            <a:r>
+              <a:rPr lang="en-US" sz="800" b="1">
+                <a:solidFill>
+                  <a:schemeClr val="bg1"/>
+                </a:solidFill>
+              </a:rPr>
+              <a:t>Peminjaman yang belum dikembalikan</a:t>
+            </a:r>
+          </a:p>
+        </p:txBody>
+      </p:sp>
+      <p:graphicFrame>
+        <p:nvGraphicFramePr>
+          <p:cNvPr id="18" name="Table 17">
+            <a:extLst>
+              <a:ext uri="{FF2B5EF4-FFF2-40B4-BE49-F238E27FC236}">
+                <a16:creationId xmlns:a16="http://schemas.microsoft.com/office/drawing/2014/main" id="{7410321D-D3D2-105D-10E4-2665AC781C81}"/>
+              </a:ext>
+            </a:extLst>
+          </p:cNvPr>
+          <p:cNvGraphicFramePr>
+            <a:graphicFrameLocks noGrp="1"/>
+          </p:cNvGraphicFramePr>
+          <p:nvPr>
+            <p:extLst>
+              <p:ext uri="{D42A27DB-BD31-4B8C-83A1-F6EECF244321}">
+                <p14:modId xmlns:p14="http://schemas.microsoft.com/office/powerpoint/2010/main" val="1752506257"/>
+              </p:ext>
+            </p:extLst>
+          </p:nvPr>
+        </p:nvGraphicFramePr>
+        <p:xfrm>
+          <a:off x="6803988" y="4112010"/>
+          <a:ext cx="4748676" cy="1097280"/>
+        </p:xfrm>
+        <a:graphic>
+          <a:graphicData uri="http://schemas.openxmlformats.org/drawingml/2006/table">
+            <a:tbl>
+              <a:tblPr>
+                <a:tableStyleId>{5C22544A-7EE6-4342-B048-85BDC9FD1C3A}</a:tableStyleId>
+              </a:tblPr>
+              <a:tblGrid>
+                <a:gridCol w="472381">
+                  <a:extLst>
+                    <a:ext uri="{9D8B030D-6E8A-4147-A177-3AD203B41FA5}">
+                      <a16:colId xmlns:a16="http://schemas.microsoft.com/office/drawing/2014/main" val="2536449118"/>
+                    </a:ext>
+                  </a:extLst>
+                </a:gridCol>
+                <a:gridCol w="1218247">
+                  <a:extLst>
+                    <a:ext uri="{9D8B030D-6E8A-4147-A177-3AD203B41FA5}">
+                      <a16:colId xmlns:a16="http://schemas.microsoft.com/office/drawing/2014/main" val="937342880"/>
+                    </a:ext>
+                  </a:extLst>
+                </a:gridCol>
+                <a:gridCol w="1292833">
+                  <a:extLst>
+                    <a:ext uri="{9D8B030D-6E8A-4147-A177-3AD203B41FA5}">
+                      <a16:colId xmlns:a16="http://schemas.microsoft.com/office/drawing/2014/main" val="527141037"/>
+                    </a:ext>
+                  </a:extLst>
+                </a:gridCol>
+                <a:gridCol w="1765215">
+                  <a:extLst>
+                    <a:ext uri="{9D8B030D-6E8A-4147-A177-3AD203B41FA5}">
+                      <a16:colId xmlns:a16="http://schemas.microsoft.com/office/drawing/2014/main" val="3342315033"/>
+                    </a:ext>
+                  </a:extLst>
+                </a:gridCol>
+              </a:tblGrid>
+              <a:tr h="182880">
+                <a:tc>
+                  <a:txBody>
+                    <a:bodyPr/>
+                    <a:lstStyle/>
+                    <a:p>
+                      <a:pPr algn="l" fontAlgn="b">
+                        <a:buNone/>
+                      </a:pPr>
+                      <a:r>
+                        <a:rPr lang="en-US" sz="900" u="none" strike="noStrike">
+                          <a:effectLst/>
+                        </a:rPr>
+                        <a:t>No</a:t>
+                      </a:r>
+                      <a:endParaRPr lang="en-US" sz="900" b="0" i="0" u="none" strike="noStrike">
+                        <a:solidFill>
+                          <a:srgbClr val="000000"/>
+                        </a:solidFill>
+                        <a:effectLst/>
+                        <a:latin typeface="Calibri" panose="020F0502020204030204" pitchFamily="34" charset="0"/>
+                      </a:endParaRPr>
+                    </a:p>
+                  </a:txBody>
+                  <a:tcPr marL="7620" marR="7620" marT="7620" marB="0" anchor="b"/>
+                </a:tc>
+                <a:tc>
+                  <a:txBody>
+                    <a:bodyPr/>
+                    <a:lstStyle/>
+                    <a:p>
+                      <a:pPr algn="l" fontAlgn="b">
+                        <a:buNone/>
+                      </a:pPr>
+                      <a:r>
+                        <a:rPr lang="en-US" sz="900" u="none" strike="noStrike">
+                          <a:effectLst/>
+                        </a:rPr>
+                        <a:t>Nama Alat</a:t>
+                      </a:r>
+                      <a:endParaRPr lang="en-US" sz="900" b="0" i="0" u="none" strike="noStrike">
+                        <a:solidFill>
+                          <a:srgbClr val="000000"/>
+                        </a:solidFill>
+                        <a:effectLst/>
+                        <a:latin typeface="Calibri" panose="020F0502020204030204" pitchFamily="34" charset="0"/>
+                      </a:endParaRPr>
+                    </a:p>
+                  </a:txBody>
+                  <a:tcPr marL="7620" marR="7620" marT="7620" marB="0" anchor="b"/>
+                </a:tc>
+                <a:tc>
+                  <a:txBody>
+                    <a:bodyPr/>
+                    <a:lstStyle/>
+                    <a:p>
+                      <a:pPr algn="l" fontAlgn="b">
+                        <a:buNone/>
+                      </a:pPr>
+                      <a:r>
+                        <a:rPr lang="en-US" sz="900" u="none" strike="noStrike">
+                          <a:effectLst/>
+                        </a:rPr>
+                        <a:t>Tanggal peminjaman</a:t>
+                      </a:r>
+                      <a:endParaRPr lang="en-US" sz="900" b="0" i="0" u="none" strike="noStrike">
+                        <a:solidFill>
+                          <a:srgbClr val="000000"/>
+                        </a:solidFill>
+                        <a:effectLst/>
+                        <a:latin typeface="Calibri" panose="020F0502020204030204" pitchFamily="34" charset="0"/>
+                      </a:endParaRPr>
+                    </a:p>
+                  </a:txBody>
+                  <a:tcPr marL="7620" marR="7620" marT="7620" marB="0" anchor="b"/>
+                </a:tc>
+                <a:tc>
+                  <a:txBody>
+                    <a:bodyPr/>
+                    <a:lstStyle/>
+                    <a:p>
+                      <a:pPr algn="l" fontAlgn="b">
+                        <a:buNone/>
+                      </a:pPr>
+                      <a:r>
+                        <a:rPr lang="en-US" sz="900" u="none" strike="noStrike">
+                          <a:effectLst/>
+                        </a:rPr>
+                        <a:t>status</a:t>
+                      </a:r>
+                      <a:endParaRPr lang="en-US" sz="900" b="0" i="0" u="none" strike="noStrike">
+                        <a:solidFill>
+                          <a:srgbClr val="000000"/>
+                        </a:solidFill>
+                        <a:effectLst/>
+                        <a:latin typeface="Calibri" panose="020F0502020204030204" pitchFamily="34" charset="0"/>
+                      </a:endParaRPr>
+                    </a:p>
+                  </a:txBody>
+                  <a:tcPr marL="7620" marR="7620" marT="7620" marB="0" anchor="b"/>
+                </a:tc>
+                <a:extLst>
+                  <a:ext uri="{0D108BD9-81ED-4DB2-BD59-A6C34878D82A}">
+                    <a16:rowId xmlns:a16="http://schemas.microsoft.com/office/drawing/2014/main" val="1479695290"/>
+                  </a:ext>
+                </a:extLst>
+              </a:tr>
+              <a:tr h="182880">
+                <a:tc>
+                  <a:txBody>
+                    <a:bodyPr/>
+                    <a:lstStyle/>
+                    <a:p>
+                      <a:pPr algn="r" fontAlgn="b">
+                        <a:buNone/>
+                      </a:pPr>
+                      <a:r>
+                        <a:rPr lang="en-US" sz="900" u="none" strike="noStrike">
+                          <a:effectLst/>
+                        </a:rPr>
+                        <a:t>1</a:t>
+                      </a:r>
+                      <a:endParaRPr lang="en-US" sz="900" b="0" i="0" u="none" strike="noStrike">
+                        <a:solidFill>
+                          <a:srgbClr val="000000"/>
+                        </a:solidFill>
+                        <a:effectLst/>
+                        <a:latin typeface="Calibri" panose="020F0502020204030204" pitchFamily="34" charset="0"/>
+                      </a:endParaRPr>
+                    </a:p>
+                  </a:txBody>
+                  <a:tcPr marL="7620" marR="7620" marT="7620" marB="0" anchor="b"/>
+                </a:tc>
+                <a:tc>
+                  <a:txBody>
+                    <a:bodyPr/>
+                    <a:lstStyle/>
+                    <a:p>
+                      <a:pPr algn="l" fontAlgn="b">
+                        <a:buNone/>
+                      </a:pPr>
+                      <a:r>
+                        <a:rPr lang="en-US" sz="900" u="none" strike="noStrike">
+                          <a:effectLst/>
+                        </a:rPr>
+                        <a:t> </a:t>
+                      </a:r>
+                      <a:endParaRPr lang="en-US" sz="900" b="0" i="0" u="none" strike="noStrike">
+                        <a:solidFill>
+                          <a:srgbClr val="000000"/>
+                        </a:solidFill>
+                        <a:effectLst/>
+                        <a:latin typeface="Calibri" panose="020F0502020204030204" pitchFamily="34" charset="0"/>
+                      </a:endParaRPr>
+                    </a:p>
+                  </a:txBody>
+                  <a:tcPr marL="7620" marR="7620" marT="7620" marB="0" anchor="b"/>
+                </a:tc>
+                <a:tc>
+                  <a:txBody>
+                    <a:bodyPr/>
+                    <a:lstStyle/>
+                    <a:p>
+                      <a:pPr algn="l" fontAlgn="b">
+                        <a:buNone/>
+                      </a:pPr>
+                      <a:r>
+                        <a:rPr lang="en-US" sz="900" u="none" strike="noStrike">
+                          <a:effectLst/>
+                        </a:rPr>
+                        <a:t> </a:t>
+                      </a:r>
+                      <a:endParaRPr lang="en-US" sz="900" b="0" i="0" u="none" strike="noStrike">
+                        <a:solidFill>
+                          <a:srgbClr val="000000"/>
+                        </a:solidFill>
+                        <a:effectLst/>
+                        <a:latin typeface="Calibri" panose="020F0502020204030204" pitchFamily="34" charset="0"/>
+                      </a:endParaRPr>
+                    </a:p>
+                  </a:txBody>
+                  <a:tcPr marL="7620" marR="7620" marT="7620" marB="0" anchor="b"/>
+                </a:tc>
+                <a:tc>
+                  <a:txBody>
+                    <a:bodyPr/>
+                    <a:lstStyle/>
+                    <a:p>
+                      <a:pPr algn="l" fontAlgn="b">
+                        <a:buNone/>
+                      </a:pPr>
+                      <a:r>
+                        <a:rPr lang="en-US" sz="900" u="none" strike="noStrike">
+                          <a:effectLst/>
+                        </a:rPr>
+                        <a:t> </a:t>
+                      </a:r>
+                      <a:endParaRPr lang="en-US" sz="900" b="0" i="0" u="none" strike="noStrike">
+                        <a:solidFill>
+                          <a:srgbClr val="000000"/>
+                        </a:solidFill>
+                        <a:effectLst/>
+                        <a:latin typeface="Calibri" panose="020F0502020204030204" pitchFamily="34" charset="0"/>
+                      </a:endParaRPr>
+                    </a:p>
+                  </a:txBody>
+                  <a:tcPr marL="7620" marR="7620" marT="7620" marB="0" anchor="b"/>
+                </a:tc>
+                <a:extLst>
+                  <a:ext uri="{0D108BD9-81ED-4DB2-BD59-A6C34878D82A}">
+                    <a16:rowId xmlns:a16="http://schemas.microsoft.com/office/drawing/2014/main" val="2403968294"/>
+                  </a:ext>
+                </a:extLst>
+              </a:tr>
+              <a:tr h="182880">
+                <a:tc>
+                  <a:txBody>
+                    <a:bodyPr/>
+                    <a:lstStyle/>
+                    <a:p>
+                      <a:pPr algn="r" fontAlgn="b">
+                        <a:buNone/>
+                      </a:pPr>
+                      <a:r>
+                        <a:rPr lang="en-US" sz="900" u="none" strike="noStrike">
+                          <a:effectLst/>
+                        </a:rPr>
+                        <a:t>2</a:t>
+                      </a:r>
+                      <a:endParaRPr lang="en-US" sz="900" b="0" i="0" u="none" strike="noStrike">
+                        <a:solidFill>
+                          <a:srgbClr val="000000"/>
+                        </a:solidFill>
+                        <a:effectLst/>
+                        <a:latin typeface="Calibri" panose="020F0502020204030204" pitchFamily="34" charset="0"/>
+                      </a:endParaRPr>
+                    </a:p>
+                  </a:txBody>
+                  <a:tcPr marL="7620" marR="7620" marT="7620" marB="0" anchor="b"/>
+                </a:tc>
+                <a:tc>
+                  <a:txBody>
+                    <a:bodyPr/>
+                    <a:lstStyle/>
+                    <a:p>
+                      <a:pPr algn="l" fontAlgn="b">
+                        <a:buNone/>
+                      </a:pPr>
+                      <a:r>
+                        <a:rPr lang="en-US" sz="900" u="none" strike="noStrike">
+                          <a:effectLst/>
+                        </a:rPr>
+                        <a:t> </a:t>
+                      </a:r>
+                      <a:endParaRPr lang="en-US" sz="900" b="0" i="0" u="none" strike="noStrike">
+                        <a:solidFill>
+                          <a:srgbClr val="000000"/>
+                        </a:solidFill>
+                        <a:effectLst/>
+                        <a:latin typeface="Calibri" panose="020F0502020204030204" pitchFamily="34" charset="0"/>
+                      </a:endParaRPr>
+                    </a:p>
+                  </a:txBody>
+                  <a:tcPr marL="7620" marR="7620" marT="7620" marB="0" anchor="b"/>
+                </a:tc>
+                <a:tc>
+                  <a:txBody>
+                    <a:bodyPr/>
+                    <a:lstStyle/>
+                    <a:p>
+                      <a:pPr algn="l" fontAlgn="b">
+                        <a:buNone/>
+                      </a:pPr>
+                      <a:r>
+                        <a:rPr lang="en-US" sz="900" u="none" strike="noStrike">
+                          <a:effectLst/>
+                        </a:rPr>
+                        <a:t> </a:t>
+                      </a:r>
+                      <a:endParaRPr lang="en-US" sz="900" b="0" i="0" u="none" strike="noStrike">
+                        <a:solidFill>
+                          <a:srgbClr val="000000"/>
+                        </a:solidFill>
+                        <a:effectLst/>
+                        <a:latin typeface="Calibri" panose="020F0502020204030204" pitchFamily="34" charset="0"/>
+                      </a:endParaRPr>
+                    </a:p>
+                  </a:txBody>
+                  <a:tcPr marL="7620" marR="7620" marT="7620" marB="0" anchor="b"/>
+                </a:tc>
+                <a:tc>
+                  <a:txBody>
+                    <a:bodyPr/>
+                    <a:lstStyle/>
+                    <a:p>
+                      <a:pPr algn="l" fontAlgn="b">
+                        <a:buNone/>
+                      </a:pPr>
+                      <a:r>
+                        <a:rPr lang="en-US" sz="900" u="none" strike="noStrike">
+                          <a:effectLst/>
+                        </a:rPr>
+                        <a:t> </a:t>
+                      </a:r>
+                      <a:endParaRPr lang="en-US" sz="900" b="0" i="0" u="none" strike="noStrike">
+                        <a:solidFill>
+                          <a:srgbClr val="000000"/>
+                        </a:solidFill>
+                        <a:effectLst/>
+                        <a:latin typeface="Calibri" panose="020F0502020204030204" pitchFamily="34" charset="0"/>
+                      </a:endParaRPr>
+                    </a:p>
+                  </a:txBody>
+                  <a:tcPr marL="7620" marR="7620" marT="7620" marB="0" anchor="b"/>
+                </a:tc>
+                <a:extLst>
+                  <a:ext uri="{0D108BD9-81ED-4DB2-BD59-A6C34878D82A}">
+                    <a16:rowId xmlns:a16="http://schemas.microsoft.com/office/drawing/2014/main" val="2983074990"/>
+                  </a:ext>
+                </a:extLst>
+              </a:tr>
+              <a:tr h="182880">
+                <a:tc>
+                  <a:txBody>
+                    <a:bodyPr/>
+                    <a:lstStyle/>
+                    <a:p>
+                      <a:pPr algn="r" fontAlgn="b">
+                        <a:buNone/>
+                      </a:pPr>
+                      <a:r>
+                        <a:rPr lang="en-US" sz="900" u="none" strike="noStrike">
+                          <a:effectLst/>
+                        </a:rPr>
+                        <a:t>3</a:t>
+                      </a:r>
+                      <a:endParaRPr lang="en-US" sz="900" b="0" i="0" u="none" strike="noStrike">
+                        <a:solidFill>
+                          <a:srgbClr val="000000"/>
+                        </a:solidFill>
+                        <a:effectLst/>
+                        <a:latin typeface="Calibri" panose="020F0502020204030204" pitchFamily="34" charset="0"/>
+                      </a:endParaRPr>
+                    </a:p>
+                  </a:txBody>
+                  <a:tcPr marL="7620" marR="7620" marT="7620" marB="0" anchor="b"/>
+                </a:tc>
+                <a:tc>
+                  <a:txBody>
+                    <a:bodyPr/>
+                    <a:lstStyle/>
+                    <a:p>
+                      <a:pPr algn="l" fontAlgn="b">
+                        <a:buNone/>
+                      </a:pPr>
+                      <a:r>
+                        <a:rPr lang="en-US" sz="900" u="none" strike="noStrike">
+                          <a:effectLst/>
+                        </a:rPr>
+                        <a:t> </a:t>
+                      </a:r>
+                      <a:endParaRPr lang="en-US" sz="900" b="0" i="0" u="none" strike="noStrike">
+                        <a:solidFill>
+                          <a:srgbClr val="000000"/>
+                        </a:solidFill>
+                        <a:effectLst/>
+                        <a:latin typeface="Calibri" panose="020F0502020204030204" pitchFamily="34" charset="0"/>
+                      </a:endParaRPr>
+                    </a:p>
+                  </a:txBody>
+                  <a:tcPr marL="7620" marR="7620" marT="7620" marB="0" anchor="b"/>
+                </a:tc>
+                <a:tc>
+                  <a:txBody>
+                    <a:bodyPr/>
+                    <a:lstStyle/>
+                    <a:p>
+                      <a:pPr algn="l" fontAlgn="b">
+                        <a:buNone/>
+                      </a:pPr>
+                      <a:r>
+                        <a:rPr lang="en-US" sz="900" u="none" strike="noStrike">
+                          <a:effectLst/>
+                        </a:rPr>
+                        <a:t> </a:t>
+                      </a:r>
+                      <a:endParaRPr lang="en-US" sz="900" b="0" i="0" u="none" strike="noStrike">
+                        <a:solidFill>
+                          <a:srgbClr val="000000"/>
+                        </a:solidFill>
+                        <a:effectLst/>
+                        <a:latin typeface="Calibri" panose="020F0502020204030204" pitchFamily="34" charset="0"/>
+                      </a:endParaRPr>
+                    </a:p>
+                  </a:txBody>
+                  <a:tcPr marL="7620" marR="7620" marT="7620" marB="0" anchor="b"/>
+                </a:tc>
+                <a:tc>
+                  <a:txBody>
+                    <a:bodyPr/>
+                    <a:lstStyle/>
+                    <a:p>
+                      <a:pPr algn="l" fontAlgn="b">
+                        <a:buNone/>
+                      </a:pPr>
+                      <a:r>
+                        <a:rPr lang="en-US" sz="900" u="none" strike="noStrike">
+                          <a:effectLst/>
+                        </a:rPr>
+                        <a:t> </a:t>
+                      </a:r>
+                      <a:endParaRPr lang="en-US" sz="900" b="0" i="0" u="none" strike="noStrike">
+                        <a:solidFill>
+                          <a:srgbClr val="000000"/>
+                        </a:solidFill>
+                        <a:effectLst/>
+                        <a:latin typeface="Calibri" panose="020F0502020204030204" pitchFamily="34" charset="0"/>
+                      </a:endParaRPr>
+                    </a:p>
+                  </a:txBody>
+                  <a:tcPr marL="7620" marR="7620" marT="7620" marB="0" anchor="b"/>
+                </a:tc>
+                <a:extLst>
+                  <a:ext uri="{0D108BD9-81ED-4DB2-BD59-A6C34878D82A}">
+                    <a16:rowId xmlns:a16="http://schemas.microsoft.com/office/drawing/2014/main" val="2033012975"/>
+                  </a:ext>
+                </a:extLst>
+              </a:tr>
+              <a:tr h="182880">
+                <a:tc>
+                  <a:txBody>
+                    <a:bodyPr/>
+                    <a:lstStyle/>
+                    <a:p>
+                      <a:pPr algn="r" fontAlgn="b">
+                        <a:buNone/>
+                      </a:pPr>
+                      <a:r>
+                        <a:rPr lang="en-US" sz="900" u="none" strike="noStrike">
+                          <a:effectLst/>
+                        </a:rPr>
+                        <a:t>4</a:t>
+                      </a:r>
+                      <a:endParaRPr lang="en-US" sz="900" b="0" i="0" u="none" strike="noStrike">
+                        <a:solidFill>
+                          <a:srgbClr val="000000"/>
+                        </a:solidFill>
+                        <a:effectLst/>
+                        <a:latin typeface="Calibri" panose="020F0502020204030204" pitchFamily="34" charset="0"/>
+                      </a:endParaRPr>
+                    </a:p>
+                  </a:txBody>
+                  <a:tcPr marL="7620" marR="7620" marT="7620" marB="0" anchor="b"/>
+                </a:tc>
+                <a:tc>
+                  <a:txBody>
+                    <a:bodyPr/>
+                    <a:lstStyle/>
+                    <a:p>
+                      <a:pPr algn="l" fontAlgn="b">
+                        <a:buNone/>
+                      </a:pPr>
+                      <a:r>
+                        <a:rPr lang="en-US" sz="900" u="none" strike="noStrike">
+                          <a:effectLst/>
+                        </a:rPr>
+                        <a:t> </a:t>
+                      </a:r>
+                      <a:endParaRPr lang="en-US" sz="900" b="0" i="0" u="none" strike="noStrike">
+                        <a:solidFill>
+                          <a:srgbClr val="000000"/>
+                        </a:solidFill>
+                        <a:effectLst/>
+                        <a:latin typeface="Calibri" panose="020F0502020204030204" pitchFamily="34" charset="0"/>
+                      </a:endParaRPr>
+                    </a:p>
+                  </a:txBody>
+                  <a:tcPr marL="7620" marR="7620" marT="7620" marB="0" anchor="b"/>
+                </a:tc>
+                <a:tc>
+                  <a:txBody>
+                    <a:bodyPr/>
+                    <a:lstStyle/>
+                    <a:p>
+                      <a:pPr algn="l" fontAlgn="b">
+                        <a:buNone/>
+                      </a:pPr>
+                      <a:r>
+                        <a:rPr lang="en-US" sz="900" u="none" strike="noStrike">
+                          <a:effectLst/>
+                        </a:rPr>
+                        <a:t> </a:t>
+                      </a:r>
+                      <a:endParaRPr lang="en-US" sz="900" b="0" i="0" u="none" strike="noStrike">
+                        <a:solidFill>
+                          <a:srgbClr val="000000"/>
+                        </a:solidFill>
+                        <a:effectLst/>
+                        <a:latin typeface="Calibri" panose="020F0502020204030204" pitchFamily="34" charset="0"/>
+                      </a:endParaRPr>
+                    </a:p>
+                  </a:txBody>
+                  <a:tcPr marL="7620" marR="7620" marT="7620" marB="0" anchor="b"/>
+                </a:tc>
+                <a:tc>
+                  <a:txBody>
+                    <a:bodyPr/>
+                    <a:lstStyle/>
+                    <a:p>
+                      <a:pPr algn="l" fontAlgn="b">
+                        <a:buNone/>
+                      </a:pPr>
+                      <a:r>
+                        <a:rPr lang="en-US" sz="900" u="none" strike="noStrike">
+                          <a:effectLst/>
+                        </a:rPr>
+                        <a:t> </a:t>
+                      </a:r>
+                      <a:endParaRPr lang="en-US" sz="900" b="0" i="0" u="none" strike="noStrike">
+                        <a:solidFill>
+                          <a:srgbClr val="000000"/>
+                        </a:solidFill>
+                        <a:effectLst/>
+                        <a:latin typeface="Calibri" panose="020F0502020204030204" pitchFamily="34" charset="0"/>
+                      </a:endParaRPr>
+                    </a:p>
+                  </a:txBody>
+                  <a:tcPr marL="7620" marR="7620" marT="7620" marB="0" anchor="b"/>
+                </a:tc>
+                <a:extLst>
+                  <a:ext uri="{0D108BD9-81ED-4DB2-BD59-A6C34878D82A}">
+                    <a16:rowId xmlns:a16="http://schemas.microsoft.com/office/drawing/2014/main" val="998884347"/>
+                  </a:ext>
+                </a:extLst>
+              </a:tr>
+              <a:tr h="182880">
+                <a:tc>
+                  <a:txBody>
+                    <a:bodyPr/>
+                    <a:lstStyle/>
+                    <a:p>
+                      <a:pPr algn="r" fontAlgn="b">
+                        <a:buNone/>
+                      </a:pPr>
+                      <a:r>
+                        <a:rPr lang="en-US" sz="900" u="none" strike="noStrike">
+                          <a:effectLst/>
+                        </a:rPr>
+                        <a:t>5</a:t>
+                      </a:r>
+                      <a:endParaRPr lang="en-US" sz="900" b="0" i="0" u="none" strike="noStrike">
+                        <a:solidFill>
+                          <a:srgbClr val="000000"/>
+                        </a:solidFill>
+                        <a:effectLst/>
+                        <a:latin typeface="Calibri" panose="020F0502020204030204" pitchFamily="34" charset="0"/>
+                      </a:endParaRPr>
+                    </a:p>
+                  </a:txBody>
+                  <a:tcPr marL="7620" marR="7620" marT="7620" marB="0" anchor="b"/>
+                </a:tc>
+                <a:tc>
+                  <a:txBody>
+                    <a:bodyPr/>
+                    <a:lstStyle/>
+                    <a:p>
+                      <a:pPr algn="l" fontAlgn="b">
+                        <a:buNone/>
+                      </a:pPr>
+                      <a:r>
+                        <a:rPr lang="en-US" sz="900" u="none" strike="noStrike">
+                          <a:effectLst/>
+                        </a:rPr>
+                        <a:t> </a:t>
+                      </a:r>
+                      <a:endParaRPr lang="en-US" sz="900" b="0" i="0" u="none" strike="noStrike">
+                        <a:solidFill>
+                          <a:srgbClr val="000000"/>
+                        </a:solidFill>
+                        <a:effectLst/>
+                        <a:latin typeface="Calibri" panose="020F0502020204030204" pitchFamily="34" charset="0"/>
+                      </a:endParaRPr>
+                    </a:p>
+                  </a:txBody>
+                  <a:tcPr marL="7620" marR="7620" marT="7620" marB="0" anchor="b"/>
+                </a:tc>
+                <a:tc>
+                  <a:txBody>
+                    <a:bodyPr/>
+                    <a:lstStyle/>
+                    <a:p>
+                      <a:pPr algn="l" fontAlgn="b">
+                        <a:buNone/>
+                      </a:pPr>
+                      <a:r>
+                        <a:rPr lang="en-US" sz="900" u="none" strike="noStrike">
+                          <a:effectLst/>
+                        </a:rPr>
+                        <a:t> </a:t>
+                      </a:r>
+                      <a:endParaRPr lang="en-US" sz="900" b="0" i="0" u="none" strike="noStrike">
+                        <a:solidFill>
+                          <a:srgbClr val="000000"/>
+                        </a:solidFill>
+                        <a:effectLst/>
+                        <a:latin typeface="Calibri" panose="020F0502020204030204" pitchFamily="34" charset="0"/>
+                      </a:endParaRPr>
+                    </a:p>
+                  </a:txBody>
+                  <a:tcPr marL="7620" marR="7620" marT="7620" marB="0" anchor="b"/>
+                </a:tc>
+                <a:tc>
+                  <a:txBody>
+                    <a:bodyPr/>
+                    <a:lstStyle/>
+                    <a:p>
+                      <a:pPr algn="l" fontAlgn="b">
+                        <a:buNone/>
+                      </a:pPr>
+                      <a:r>
+                        <a:rPr lang="en-US" sz="900" u="none" strike="noStrike">
+                          <a:effectLst/>
+                        </a:rPr>
+                        <a:t> </a:t>
+                      </a:r>
+                      <a:endParaRPr lang="en-US" sz="900" b="0" i="0" u="none" strike="noStrike">
+                        <a:solidFill>
+                          <a:srgbClr val="000000"/>
+                        </a:solidFill>
+                        <a:effectLst/>
+                        <a:latin typeface="Calibri" panose="020F0502020204030204" pitchFamily="34" charset="0"/>
+                      </a:endParaRPr>
+                    </a:p>
+                  </a:txBody>
+                  <a:tcPr marL="7620" marR="7620" marT="7620" marB="0" anchor="b"/>
+                </a:tc>
+                <a:extLst>
+                  <a:ext uri="{0D108BD9-81ED-4DB2-BD59-A6C34878D82A}">
+                    <a16:rowId xmlns:a16="http://schemas.microsoft.com/office/drawing/2014/main" val="2828225722"/>
+                  </a:ext>
+                </a:extLst>
+              </a:tr>
+            </a:tbl>
+          </a:graphicData>
+        </a:graphic>
+      </p:graphicFrame>
+      <p:sp>
+        <p:nvSpPr>
+          <p:cNvPr id="19" name="Rectangle: Rounded Corners 18">
+            <a:extLst>
+              <a:ext uri="{FF2B5EF4-FFF2-40B4-BE49-F238E27FC236}">
+                <a16:creationId xmlns:a16="http://schemas.microsoft.com/office/drawing/2014/main" id="{32D5FBB0-67FC-B6C5-6087-71E3FA96AA49}"/>
+              </a:ext>
+            </a:extLst>
+          </p:cNvPr>
+          <p:cNvSpPr/>
+          <p:nvPr/>
+        </p:nvSpPr>
+        <p:spPr>
+          <a:xfrm>
+            <a:off x="1292387" y="3701776"/>
+            <a:ext cx="4864573" cy="284020"/>
+          </a:xfrm>
+          <a:prstGeom prst="roundRect">
+            <a:avLst/>
+          </a:prstGeom>
+          <a:solidFill>
+            <a:schemeClr val="accent1"/>
+          </a:solidFill>
+          <a:ln>
+            <a:noFill/>
+          </a:ln>
+        </p:spPr>
+        <p:style>
+          <a:lnRef idx="2">
+            <a:schemeClr val="accent1">
+              <a:shade val="15000"/>
+            </a:schemeClr>
+          </a:lnRef>
+          <a:fillRef idx="1">
+            <a:schemeClr val="accent1"/>
+          </a:fillRef>
+          <a:effectRef idx="0">
+            <a:schemeClr val="accent1"/>
+          </a:effectRef>
+          <a:fontRef idx="minor">
+            <a:schemeClr val="lt1"/>
+          </a:fontRef>
+        </p:style>
+        <p:txBody>
+          <a:bodyPr rtlCol="0" anchor="ctr"/>
+          <a:lstStyle/>
+          <a:p>
+            <a:r>
+              <a:rPr lang="en-US" sz="800" b="1">
+                <a:solidFill>
+                  <a:schemeClr val="bg1"/>
+                </a:solidFill>
+              </a:rPr>
+              <a:t>Riwayat seluruh peminjaman yang pernah dilakukan</a:t>
+            </a:r>
+          </a:p>
+        </p:txBody>
+      </p:sp>
+      <p:graphicFrame>
+        <p:nvGraphicFramePr>
+          <p:cNvPr id="20" name="Table 19">
+            <a:extLst>
+              <a:ext uri="{FF2B5EF4-FFF2-40B4-BE49-F238E27FC236}">
+                <a16:creationId xmlns:a16="http://schemas.microsoft.com/office/drawing/2014/main" id="{31C0D595-F31C-DE53-3593-4E478A4162F5}"/>
+              </a:ext>
+            </a:extLst>
+          </p:cNvPr>
+          <p:cNvGraphicFramePr>
+            <a:graphicFrameLocks noGrp="1"/>
+          </p:cNvGraphicFramePr>
+          <p:nvPr>
+            <p:extLst>
+              <p:ext uri="{D42A27DB-BD31-4B8C-83A1-F6EECF244321}">
+                <p14:modId xmlns:p14="http://schemas.microsoft.com/office/powerpoint/2010/main" val="3552332922"/>
+              </p:ext>
+            </p:extLst>
+          </p:nvPr>
+        </p:nvGraphicFramePr>
+        <p:xfrm>
+          <a:off x="1347324" y="4112010"/>
+          <a:ext cx="4748676" cy="1097280"/>
+        </p:xfrm>
+        <a:graphic>
+          <a:graphicData uri="http://schemas.openxmlformats.org/drawingml/2006/table">
+            <a:tbl>
+              <a:tblPr>
+                <a:tableStyleId>{5C22544A-7EE6-4342-B048-85BDC9FD1C3A}</a:tableStyleId>
+              </a:tblPr>
+              <a:tblGrid>
+                <a:gridCol w="472381">
+                  <a:extLst>
+                    <a:ext uri="{9D8B030D-6E8A-4147-A177-3AD203B41FA5}">
+                      <a16:colId xmlns:a16="http://schemas.microsoft.com/office/drawing/2014/main" val="2536449118"/>
+                    </a:ext>
+                  </a:extLst>
+                </a:gridCol>
+                <a:gridCol w="1218247">
+                  <a:extLst>
+                    <a:ext uri="{9D8B030D-6E8A-4147-A177-3AD203B41FA5}">
+                      <a16:colId xmlns:a16="http://schemas.microsoft.com/office/drawing/2014/main" val="937342880"/>
+                    </a:ext>
+                  </a:extLst>
+                </a:gridCol>
+                <a:gridCol w="1292833">
+                  <a:extLst>
+                    <a:ext uri="{9D8B030D-6E8A-4147-A177-3AD203B41FA5}">
+                      <a16:colId xmlns:a16="http://schemas.microsoft.com/office/drawing/2014/main" val="527141037"/>
+                    </a:ext>
+                  </a:extLst>
+                </a:gridCol>
+                <a:gridCol w="1765215">
+                  <a:extLst>
+                    <a:ext uri="{9D8B030D-6E8A-4147-A177-3AD203B41FA5}">
+                      <a16:colId xmlns:a16="http://schemas.microsoft.com/office/drawing/2014/main" val="3342315033"/>
+                    </a:ext>
+                  </a:extLst>
+                </a:gridCol>
+              </a:tblGrid>
+              <a:tr h="182880">
+                <a:tc>
+                  <a:txBody>
+                    <a:bodyPr/>
+                    <a:lstStyle/>
+                    <a:p>
+                      <a:pPr algn="l" fontAlgn="b">
+                        <a:buNone/>
+                      </a:pPr>
+                      <a:r>
+                        <a:rPr lang="en-US" sz="900" u="none" strike="noStrike">
+                          <a:effectLst/>
+                        </a:rPr>
+                        <a:t>No</a:t>
+                      </a:r>
+                      <a:endParaRPr lang="en-US" sz="900" b="0" i="0" u="none" strike="noStrike">
+                        <a:solidFill>
+                          <a:srgbClr val="000000"/>
+                        </a:solidFill>
+                        <a:effectLst/>
+                        <a:latin typeface="Calibri" panose="020F0502020204030204" pitchFamily="34" charset="0"/>
+                      </a:endParaRPr>
+                    </a:p>
+                  </a:txBody>
+                  <a:tcPr marL="7620" marR="7620" marT="7620" marB="0" anchor="b"/>
+                </a:tc>
+                <a:tc>
+                  <a:txBody>
+                    <a:bodyPr/>
+                    <a:lstStyle/>
+                    <a:p>
+                      <a:pPr algn="l" fontAlgn="b">
+                        <a:buNone/>
+                      </a:pPr>
+                      <a:r>
+                        <a:rPr lang="en-US" sz="900" u="none" strike="noStrike">
+                          <a:effectLst/>
+                        </a:rPr>
+                        <a:t>Nama Alat</a:t>
+                      </a:r>
+                      <a:endParaRPr lang="en-US" sz="900" b="0" i="0" u="none" strike="noStrike">
+                        <a:solidFill>
+                          <a:srgbClr val="000000"/>
+                        </a:solidFill>
+                        <a:effectLst/>
+                        <a:latin typeface="Calibri" panose="020F0502020204030204" pitchFamily="34" charset="0"/>
+                      </a:endParaRPr>
+                    </a:p>
+                  </a:txBody>
+                  <a:tcPr marL="7620" marR="7620" marT="7620" marB="0" anchor="b"/>
+                </a:tc>
+                <a:tc>
+                  <a:txBody>
+                    <a:bodyPr/>
+                    <a:lstStyle/>
+                    <a:p>
+                      <a:pPr algn="l" fontAlgn="b">
+                        <a:buNone/>
+                      </a:pPr>
+                      <a:r>
+                        <a:rPr lang="en-US" sz="900" u="none" strike="noStrike">
+                          <a:effectLst/>
+                        </a:rPr>
+                        <a:t>Tanggal peminjaman</a:t>
+                      </a:r>
+                      <a:endParaRPr lang="en-US" sz="900" b="0" i="0" u="none" strike="noStrike">
+                        <a:solidFill>
+                          <a:srgbClr val="000000"/>
+                        </a:solidFill>
+                        <a:effectLst/>
+                        <a:latin typeface="Calibri" panose="020F0502020204030204" pitchFamily="34" charset="0"/>
+                      </a:endParaRPr>
+                    </a:p>
+                  </a:txBody>
+                  <a:tcPr marL="7620" marR="7620" marT="7620" marB="0" anchor="b"/>
+                </a:tc>
+                <a:tc>
+                  <a:txBody>
+                    <a:bodyPr/>
+                    <a:lstStyle/>
+                    <a:p>
+                      <a:pPr algn="l" fontAlgn="b">
+                        <a:buNone/>
+                      </a:pPr>
+                      <a:r>
+                        <a:rPr lang="en-US" sz="900" u="none" strike="noStrike">
+                          <a:effectLst/>
+                        </a:rPr>
+                        <a:t>Status </a:t>
+                      </a:r>
+                      <a:endParaRPr lang="en-US" sz="900" b="0" i="0" u="none" strike="noStrike">
+                        <a:solidFill>
+                          <a:srgbClr val="000000"/>
+                        </a:solidFill>
+                        <a:effectLst/>
+                        <a:latin typeface="Calibri" panose="020F0502020204030204" pitchFamily="34" charset="0"/>
+                      </a:endParaRPr>
+                    </a:p>
+                  </a:txBody>
+                  <a:tcPr marL="7620" marR="7620" marT="7620" marB="0" anchor="b"/>
+                </a:tc>
+                <a:extLst>
+                  <a:ext uri="{0D108BD9-81ED-4DB2-BD59-A6C34878D82A}">
+                    <a16:rowId xmlns:a16="http://schemas.microsoft.com/office/drawing/2014/main" val="1479695290"/>
+                  </a:ext>
+                </a:extLst>
+              </a:tr>
+              <a:tr h="182880">
+                <a:tc>
+                  <a:txBody>
+                    <a:bodyPr/>
+                    <a:lstStyle/>
+                    <a:p>
+                      <a:pPr algn="r" fontAlgn="b">
+                        <a:buNone/>
+                      </a:pPr>
+                      <a:r>
+                        <a:rPr lang="en-US" sz="900" u="none" strike="noStrike">
+                          <a:effectLst/>
+                        </a:rPr>
+                        <a:t>1</a:t>
+                      </a:r>
+                      <a:endParaRPr lang="en-US" sz="900" b="0" i="0" u="none" strike="noStrike">
+                        <a:solidFill>
+                          <a:srgbClr val="000000"/>
+                        </a:solidFill>
+                        <a:effectLst/>
+                        <a:latin typeface="Calibri" panose="020F0502020204030204" pitchFamily="34" charset="0"/>
+                      </a:endParaRPr>
+                    </a:p>
+                  </a:txBody>
+                  <a:tcPr marL="7620" marR="7620" marT="7620" marB="0" anchor="b"/>
+                </a:tc>
+                <a:tc>
+                  <a:txBody>
+                    <a:bodyPr/>
+                    <a:lstStyle/>
+                    <a:p>
+                      <a:pPr algn="l" fontAlgn="b">
+                        <a:buNone/>
+                      </a:pPr>
+                      <a:r>
+                        <a:rPr lang="en-US" sz="900" u="none" strike="noStrike">
+                          <a:effectLst/>
+                        </a:rPr>
+                        <a:t> </a:t>
+                      </a:r>
+                      <a:endParaRPr lang="en-US" sz="900" b="0" i="0" u="none" strike="noStrike">
+                        <a:solidFill>
+                          <a:srgbClr val="000000"/>
+                        </a:solidFill>
+                        <a:effectLst/>
+                        <a:latin typeface="Calibri" panose="020F0502020204030204" pitchFamily="34" charset="0"/>
+                      </a:endParaRPr>
+                    </a:p>
+                  </a:txBody>
+                  <a:tcPr marL="7620" marR="7620" marT="7620" marB="0" anchor="b"/>
+                </a:tc>
+                <a:tc>
+                  <a:txBody>
+                    <a:bodyPr/>
+                    <a:lstStyle/>
+                    <a:p>
+                      <a:pPr algn="l" fontAlgn="b">
+                        <a:buNone/>
+                      </a:pPr>
+                      <a:r>
+                        <a:rPr lang="en-US" sz="900" u="none" strike="noStrike">
+                          <a:effectLst/>
+                        </a:rPr>
+                        <a:t> </a:t>
+                      </a:r>
+                      <a:endParaRPr lang="en-US" sz="900" b="0" i="0" u="none" strike="noStrike">
+                        <a:solidFill>
+                          <a:srgbClr val="000000"/>
+                        </a:solidFill>
+                        <a:effectLst/>
+                        <a:latin typeface="Calibri" panose="020F0502020204030204" pitchFamily="34" charset="0"/>
+                      </a:endParaRPr>
+                    </a:p>
+                  </a:txBody>
+                  <a:tcPr marL="7620" marR="7620" marT="7620" marB="0" anchor="b"/>
+                </a:tc>
+                <a:tc>
+                  <a:txBody>
+                    <a:bodyPr/>
+                    <a:lstStyle/>
+                    <a:p>
+                      <a:pPr algn="l" fontAlgn="b">
+                        <a:buNone/>
+                      </a:pPr>
+                      <a:r>
+                        <a:rPr lang="en-US" sz="900" u="none" strike="noStrike">
+                          <a:effectLst/>
+                        </a:rPr>
+                        <a:t> </a:t>
+                      </a:r>
+                      <a:endParaRPr lang="en-US" sz="900" b="0" i="0" u="none" strike="noStrike">
+                        <a:solidFill>
+                          <a:srgbClr val="000000"/>
+                        </a:solidFill>
+                        <a:effectLst/>
+                        <a:latin typeface="Calibri" panose="020F0502020204030204" pitchFamily="34" charset="0"/>
+                      </a:endParaRPr>
+                    </a:p>
+                  </a:txBody>
+                  <a:tcPr marL="7620" marR="7620" marT="7620" marB="0" anchor="b"/>
+                </a:tc>
+                <a:extLst>
+                  <a:ext uri="{0D108BD9-81ED-4DB2-BD59-A6C34878D82A}">
+                    <a16:rowId xmlns:a16="http://schemas.microsoft.com/office/drawing/2014/main" val="2403968294"/>
+                  </a:ext>
+                </a:extLst>
+              </a:tr>
+              <a:tr h="182880">
+                <a:tc>
+                  <a:txBody>
+                    <a:bodyPr/>
+                    <a:lstStyle/>
+                    <a:p>
+                      <a:pPr algn="r" fontAlgn="b">
+                        <a:buNone/>
+                      </a:pPr>
+                      <a:r>
+                        <a:rPr lang="en-US" sz="900" u="none" strike="noStrike">
+                          <a:effectLst/>
+                        </a:rPr>
+                        <a:t>2</a:t>
+                      </a:r>
+                      <a:endParaRPr lang="en-US" sz="900" b="0" i="0" u="none" strike="noStrike">
+                        <a:solidFill>
+                          <a:srgbClr val="000000"/>
+                        </a:solidFill>
+                        <a:effectLst/>
+                        <a:latin typeface="Calibri" panose="020F0502020204030204" pitchFamily="34" charset="0"/>
+                      </a:endParaRPr>
+                    </a:p>
+                  </a:txBody>
+                  <a:tcPr marL="7620" marR="7620" marT="7620" marB="0" anchor="b"/>
+                </a:tc>
+                <a:tc>
+                  <a:txBody>
+                    <a:bodyPr/>
+                    <a:lstStyle/>
+                    <a:p>
+                      <a:pPr algn="l" fontAlgn="b">
+                        <a:buNone/>
+                      </a:pPr>
+                      <a:r>
+                        <a:rPr lang="en-US" sz="900" u="none" strike="noStrike">
+                          <a:effectLst/>
+                        </a:rPr>
+                        <a:t> </a:t>
+                      </a:r>
+                      <a:endParaRPr lang="en-US" sz="900" b="0" i="0" u="none" strike="noStrike">
+                        <a:solidFill>
+                          <a:srgbClr val="000000"/>
+                        </a:solidFill>
+                        <a:effectLst/>
+                        <a:latin typeface="Calibri" panose="020F0502020204030204" pitchFamily="34" charset="0"/>
+                      </a:endParaRPr>
+                    </a:p>
+                  </a:txBody>
+                  <a:tcPr marL="7620" marR="7620" marT="7620" marB="0" anchor="b"/>
+                </a:tc>
+                <a:tc>
+                  <a:txBody>
+                    <a:bodyPr/>
+                    <a:lstStyle/>
+                    <a:p>
+                      <a:pPr algn="l" fontAlgn="b">
+                        <a:buNone/>
+                      </a:pPr>
+                      <a:r>
+                        <a:rPr lang="en-US" sz="900" u="none" strike="noStrike">
+                          <a:effectLst/>
+                        </a:rPr>
+                        <a:t> </a:t>
+                      </a:r>
+                      <a:endParaRPr lang="en-US" sz="900" b="0" i="0" u="none" strike="noStrike">
+                        <a:solidFill>
+                          <a:srgbClr val="000000"/>
+                        </a:solidFill>
+                        <a:effectLst/>
+                        <a:latin typeface="Calibri" panose="020F0502020204030204" pitchFamily="34" charset="0"/>
+                      </a:endParaRPr>
+                    </a:p>
+                  </a:txBody>
+                  <a:tcPr marL="7620" marR="7620" marT="7620" marB="0" anchor="b"/>
+                </a:tc>
+                <a:tc>
+                  <a:txBody>
+                    <a:bodyPr/>
+                    <a:lstStyle/>
+                    <a:p>
+                      <a:pPr algn="l" fontAlgn="b">
+                        <a:buNone/>
+                      </a:pPr>
+                      <a:r>
+                        <a:rPr lang="en-US" sz="900" u="none" strike="noStrike">
+                          <a:effectLst/>
+                        </a:rPr>
+                        <a:t> </a:t>
+                      </a:r>
+                      <a:endParaRPr lang="en-US" sz="900" b="0" i="0" u="none" strike="noStrike">
+                        <a:solidFill>
+                          <a:srgbClr val="000000"/>
+                        </a:solidFill>
+                        <a:effectLst/>
+                        <a:latin typeface="Calibri" panose="020F0502020204030204" pitchFamily="34" charset="0"/>
+                      </a:endParaRPr>
+                    </a:p>
+                  </a:txBody>
+                  <a:tcPr marL="7620" marR="7620" marT="7620" marB="0" anchor="b"/>
+                </a:tc>
+                <a:extLst>
+                  <a:ext uri="{0D108BD9-81ED-4DB2-BD59-A6C34878D82A}">
+                    <a16:rowId xmlns:a16="http://schemas.microsoft.com/office/drawing/2014/main" val="2983074990"/>
+                  </a:ext>
+                </a:extLst>
+              </a:tr>
+              <a:tr h="182880">
+                <a:tc>
+                  <a:txBody>
+                    <a:bodyPr/>
+                    <a:lstStyle/>
+                    <a:p>
+                      <a:pPr algn="r" fontAlgn="b">
+                        <a:buNone/>
+                      </a:pPr>
+                      <a:r>
+                        <a:rPr lang="en-US" sz="900" u="none" strike="noStrike">
+                          <a:effectLst/>
+                        </a:rPr>
+                        <a:t>3</a:t>
+                      </a:r>
+                      <a:endParaRPr lang="en-US" sz="900" b="0" i="0" u="none" strike="noStrike">
+                        <a:solidFill>
+                          <a:srgbClr val="000000"/>
+                        </a:solidFill>
+                        <a:effectLst/>
+                        <a:latin typeface="Calibri" panose="020F0502020204030204" pitchFamily="34" charset="0"/>
+                      </a:endParaRPr>
+                    </a:p>
+                  </a:txBody>
+                  <a:tcPr marL="7620" marR="7620" marT="7620" marB="0" anchor="b"/>
+                </a:tc>
+                <a:tc>
+                  <a:txBody>
+                    <a:bodyPr/>
+                    <a:lstStyle/>
+                    <a:p>
+                      <a:pPr algn="l" fontAlgn="b">
+                        <a:buNone/>
+                      </a:pPr>
+                      <a:r>
+                        <a:rPr lang="en-US" sz="900" u="none" strike="noStrike">
+                          <a:effectLst/>
+                        </a:rPr>
+                        <a:t> </a:t>
+                      </a:r>
+                      <a:endParaRPr lang="en-US" sz="900" b="0" i="0" u="none" strike="noStrike">
+                        <a:solidFill>
+                          <a:srgbClr val="000000"/>
+                        </a:solidFill>
+                        <a:effectLst/>
+                        <a:latin typeface="Calibri" panose="020F0502020204030204" pitchFamily="34" charset="0"/>
+                      </a:endParaRPr>
+                    </a:p>
+                  </a:txBody>
+                  <a:tcPr marL="7620" marR="7620" marT="7620" marB="0" anchor="b"/>
+                </a:tc>
+                <a:tc>
+                  <a:txBody>
+                    <a:bodyPr/>
+                    <a:lstStyle/>
+                    <a:p>
+                      <a:pPr algn="l" fontAlgn="b">
+                        <a:buNone/>
+                      </a:pPr>
+                      <a:r>
+                        <a:rPr lang="en-US" sz="900" u="none" strike="noStrike">
+                          <a:effectLst/>
+                        </a:rPr>
+                        <a:t> </a:t>
+                      </a:r>
+                      <a:endParaRPr lang="en-US" sz="900" b="0" i="0" u="none" strike="noStrike">
+                        <a:solidFill>
+                          <a:srgbClr val="000000"/>
+                        </a:solidFill>
+                        <a:effectLst/>
+                        <a:latin typeface="Calibri" panose="020F0502020204030204" pitchFamily="34" charset="0"/>
+                      </a:endParaRPr>
+                    </a:p>
+                  </a:txBody>
+                  <a:tcPr marL="7620" marR="7620" marT="7620" marB="0" anchor="b"/>
+                </a:tc>
+                <a:tc>
+                  <a:txBody>
+                    <a:bodyPr/>
+                    <a:lstStyle/>
+                    <a:p>
+                      <a:pPr algn="l" fontAlgn="b">
+                        <a:buNone/>
+                      </a:pPr>
+                      <a:r>
+                        <a:rPr lang="en-US" sz="900" u="none" strike="noStrike">
+                          <a:effectLst/>
+                        </a:rPr>
+                        <a:t> </a:t>
+                      </a:r>
+                      <a:endParaRPr lang="en-US" sz="900" b="0" i="0" u="none" strike="noStrike">
+                        <a:solidFill>
+                          <a:srgbClr val="000000"/>
+                        </a:solidFill>
+                        <a:effectLst/>
+                        <a:latin typeface="Calibri" panose="020F0502020204030204" pitchFamily="34" charset="0"/>
+                      </a:endParaRPr>
+                    </a:p>
+                  </a:txBody>
+                  <a:tcPr marL="7620" marR="7620" marT="7620" marB="0" anchor="b"/>
+                </a:tc>
+                <a:extLst>
+                  <a:ext uri="{0D108BD9-81ED-4DB2-BD59-A6C34878D82A}">
+                    <a16:rowId xmlns:a16="http://schemas.microsoft.com/office/drawing/2014/main" val="2033012975"/>
+                  </a:ext>
+                </a:extLst>
+              </a:tr>
+              <a:tr h="182880">
+                <a:tc>
+                  <a:txBody>
+                    <a:bodyPr/>
+                    <a:lstStyle/>
+                    <a:p>
+                      <a:pPr algn="r" fontAlgn="b">
+                        <a:buNone/>
+                      </a:pPr>
+                      <a:r>
+                        <a:rPr lang="en-US" sz="900" u="none" strike="noStrike">
+                          <a:effectLst/>
+                        </a:rPr>
+                        <a:t>4</a:t>
+                      </a:r>
+                      <a:endParaRPr lang="en-US" sz="900" b="0" i="0" u="none" strike="noStrike">
+                        <a:solidFill>
+                          <a:srgbClr val="000000"/>
+                        </a:solidFill>
+                        <a:effectLst/>
+                        <a:latin typeface="Calibri" panose="020F0502020204030204" pitchFamily="34" charset="0"/>
+                      </a:endParaRPr>
+                    </a:p>
+                  </a:txBody>
+                  <a:tcPr marL="7620" marR="7620" marT="7620" marB="0" anchor="b"/>
+                </a:tc>
+                <a:tc>
+                  <a:txBody>
+                    <a:bodyPr/>
+                    <a:lstStyle/>
+                    <a:p>
+                      <a:pPr algn="l" fontAlgn="b">
+                        <a:buNone/>
+                      </a:pPr>
+                      <a:r>
+                        <a:rPr lang="en-US" sz="900" u="none" strike="noStrike">
+                          <a:effectLst/>
+                        </a:rPr>
+                        <a:t> </a:t>
+                      </a:r>
+                      <a:endParaRPr lang="en-US" sz="900" b="0" i="0" u="none" strike="noStrike">
+                        <a:solidFill>
+                          <a:srgbClr val="000000"/>
+                        </a:solidFill>
+                        <a:effectLst/>
+                        <a:latin typeface="Calibri" panose="020F0502020204030204" pitchFamily="34" charset="0"/>
+                      </a:endParaRPr>
+                    </a:p>
+                  </a:txBody>
+                  <a:tcPr marL="7620" marR="7620" marT="7620" marB="0" anchor="b"/>
+                </a:tc>
+                <a:tc>
+                  <a:txBody>
+                    <a:bodyPr/>
+                    <a:lstStyle/>
+                    <a:p>
+                      <a:pPr algn="l" fontAlgn="b">
+                        <a:buNone/>
+                      </a:pPr>
+                      <a:r>
+                        <a:rPr lang="en-US" sz="900" u="none" strike="noStrike">
+                          <a:effectLst/>
+                        </a:rPr>
+                        <a:t> </a:t>
+                      </a:r>
+                      <a:endParaRPr lang="en-US" sz="900" b="0" i="0" u="none" strike="noStrike">
+                        <a:solidFill>
+                          <a:srgbClr val="000000"/>
+                        </a:solidFill>
+                        <a:effectLst/>
+                        <a:latin typeface="Calibri" panose="020F0502020204030204" pitchFamily="34" charset="0"/>
+                      </a:endParaRPr>
+                    </a:p>
+                  </a:txBody>
+                  <a:tcPr marL="7620" marR="7620" marT="7620" marB="0" anchor="b"/>
+                </a:tc>
+                <a:tc>
+                  <a:txBody>
+                    <a:bodyPr/>
+                    <a:lstStyle/>
+                    <a:p>
+                      <a:pPr algn="l" fontAlgn="b">
+                        <a:buNone/>
+                      </a:pPr>
+                      <a:r>
+                        <a:rPr lang="en-US" sz="900" u="none" strike="noStrike">
+                          <a:effectLst/>
+                        </a:rPr>
+                        <a:t> </a:t>
+                      </a:r>
+                      <a:endParaRPr lang="en-US" sz="900" b="0" i="0" u="none" strike="noStrike">
+                        <a:solidFill>
+                          <a:srgbClr val="000000"/>
+                        </a:solidFill>
+                        <a:effectLst/>
+                        <a:latin typeface="Calibri" panose="020F0502020204030204" pitchFamily="34" charset="0"/>
+                      </a:endParaRPr>
+                    </a:p>
+                  </a:txBody>
+                  <a:tcPr marL="7620" marR="7620" marT="7620" marB="0" anchor="b"/>
+                </a:tc>
+                <a:extLst>
+                  <a:ext uri="{0D108BD9-81ED-4DB2-BD59-A6C34878D82A}">
+                    <a16:rowId xmlns:a16="http://schemas.microsoft.com/office/drawing/2014/main" val="998884347"/>
+                  </a:ext>
+                </a:extLst>
+              </a:tr>
+              <a:tr h="182880">
+                <a:tc>
+                  <a:txBody>
+                    <a:bodyPr/>
+                    <a:lstStyle/>
+                    <a:p>
+                      <a:pPr algn="r" fontAlgn="b">
+                        <a:buNone/>
+                      </a:pPr>
+                      <a:r>
+                        <a:rPr lang="en-US" sz="900" u="none" strike="noStrike">
+                          <a:effectLst/>
+                        </a:rPr>
+                        <a:t>5</a:t>
+                      </a:r>
+                      <a:endParaRPr lang="en-US" sz="900" b="0" i="0" u="none" strike="noStrike">
+                        <a:solidFill>
+                          <a:srgbClr val="000000"/>
+                        </a:solidFill>
+                        <a:effectLst/>
+                        <a:latin typeface="Calibri" panose="020F0502020204030204" pitchFamily="34" charset="0"/>
+                      </a:endParaRPr>
+                    </a:p>
+                  </a:txBody>
+                  <a:tcPr marL="7620" marR="7620" marT="7620" marB="0" anchor="b"/>
+                </a:tc>
+                <a:tc>
+                  <a:txBody>
+                    <a:bodyPr/>
+                    <a:lstStyle/>
+                    <a:p>
+                      <a:pPr algn="l" fontAlgn="b">
+                        <a:buNone/>
+                      </a:pPr>
+                      <a:r>
+                        <a:rPr lang="en-US" sz="900" u="none" strike="noStrike">
+                          <a:effectLst/>
+                        </a:rPr>
+                        <a:t> </a:t>
+                      </a:r>
+                      <a:endParaRPr lang="en-US" sz="900" b="0" i="0" u="none" strike="noStrike">
+                        <a:solidFill>
+                          <a:srgbClr val="000000"/>
+                        </a:solidFill>
+                        <a:effectLst/>
+                        <a:latin typeface="Calibri" panose="020F0502020204030204" pitchFamily="34" charset="0"/>
+                      </a:endParaRPr>
+                    </a:p>
+                  </a:txBody>
+                  <a:tcPr marL="7620" marR="7620" marT="7620" marB="0" anchor="b"/>
+                </a:tc>
+                <a:tc>
+                  <a:txBody>
+                    <a:bodyPr/>
+                    <a:lstStyle/>
+                    <a:p>
+                      <a:pPr algn="l" fontAlgn="b">
+                        <a:buNone/>
+                      </a:pPr>
+                      <a:r>
+                        <a:rPr lang="en-US" sz="900" u="none" strike="noStrike">
+                          <a:effectLst/>
+                        </a:rPr>
+                        <a:t> </a:t>
+                      </a:r>
+                      <a:endParaRPr lang="en-US" sz="900" b="0" i="0" u="none" strike="noStrike">
+                        <a:solidFill>
+                          <a:srgbClr val="000000"/>
+                        </a:solidFill>
+                        <a:effectLst/>
+                        <a:latin typeface="Calibri" panose="020F0502020204030204" pitchFamily="34" charset="0"/>
+                      </a:endParaRPr>
+                    </a:p>
+                  </a:txBody>
+                  <a:tcPr marL="7620" marR="7620" marT="7620" marB="0" anchor="b"/>
+                </a:tc>
+                <a:tc>
+                  <a:txBody>
+                    <a:bodyPr/>
+                    <a:lstStyle/>
+                    <a:p>
+                      <a:pPr algn="l" fontAlgn="b">
+                        <a:buNone/>
+                      </a:pPr>
+                      <a:r>
+                        <a:rPr lang="en-US" sz="900" u="none" strike="noStrike">
+                          <a:effectLst/>
+                        </a:rPr>
+                        <a:t> </a:t>
+                      </a:r>
+                      <a:endParaRPr lang="en-US" sz="900" b="0" i="0" u="none" strike="noStrike">
+                        <a:solidFill>
+                          <a:srgbClr val="000000"/>
+                        </a:solidFill>
+                        <a:effectLst/>
+                        <a:latin typeface="Calibri" panose="020F0502020204030204" pitchFamily="34" charset="0"/>
+                      </a:endParaRPr>
+                    </a:p>
+                  </a:txBody>
+                  <a:tcPr marL="7620" marR="7620" marT="7620" marB="0" anchor="b"/>
+                </a:tc>
+                <a:extLst>
+                  <a:ext uri="{0D108BD9-81ED-4DB2-BD59-A6C34878D82A}">
+                    <a16:rowId xmlns:a16="http://schemas.microsoft.com/office/drawing/2014/main" val="2828225722"/>
+                  </a:ext>
+                </a:extLst>
+              </a:tr>
+            </a:tbl>
+          </a:graphicData>
+        </a:graphic>
+      </p:graphicFrame>
+      <p:pic>
+        <p:nvPicPr>
+          <p:cNvPr id="21" name="Picture 20">
+            <a:extLst>
+              <a:ext uri="{FF2B5EF4-FFF2-40B4-BE49-F238E27FC236}">
+                <a16:creationId xmlns:a16="http://schemas.microsoft.com/office/drawing/2014/main" id="{69CC6BAD-CE4B-3351-9C19-A3C8F0565D40}"/>
+              </a:ext>
+            </a:extLst>
+          </p:cNvPr>
+          <p:cNvPicPr>
+            <a:picLocks noChangeAspect="1"/>
+          </p:cNvPicPr>
+          <p:nvPr/>
+        </p:nvPicPr>
+        <p:blipFill>
+          <a:blip r:embed="rId5"/>
+          <a:stretch>
+            <a:fillRect/>
+          </a:stretch>
+        </p:blipFill>
+        <p:spPr>
+          <a:xfrm>
+            <a:off x="2213805" y="5695909"/>
+            <a:ext cx="7886310" cy="482940"/>
+          </a:xfrm>
+          <a:prstGeom prst="rect">
+            <a:avLst/>
+          </a:prstGeom>
+        </p:spPr>
+      </p:pic>
+    </p:spTree>
+    <p:extLst>
+      <p:ext uri="{BB962C8B-B14F-4D97-AF65-F5344CB8AC3E}">
+        <p14:creationId xmlns:p14="http://schemas.microsoft.com/office/powerpoint/2010/main" val="1597641754"/>
+      </p:ext>
+    </p:extLst>
+  </p:cSld>
+  <p:clrMapOvr>
+    <a:masterClrMapping/>
+  </p:clrMapOvr>
+</p:sld>
+</file>
+
+<file path=ppt/slides/slide10.xml><?xml version="1.0" encoding="utf-8"?>
+<p:sld xmlns:a="http://schemas.openxmlformats.org/drawingml/2006/main" xmlns:r="http://schemas.openxmlformats.org/officeDocument/2006/relationships" xmlns:p="http://schemas.openxmlformats.org/presentationml/2006/main">
+  <p:cSld>
+    <p:spTree>
+      <p:nvGrpSpPr>
+        <p:cNvPr id="1" name="">
+          <a:extLst>
+            <a:ext uri="{FF2B5EF4-FFF2-40B4-BE49-F238E27FC236}">
+              <a16:creationId xmlns:a16="http://schemas.microsoft.com/office/drawing/2014/main" id="{163110F5-6F6D-413E-FC99-133EC870DC5D}"/>
+            </a:ext>
+          </a:extLst>
+        </p:cNvPr>
+        <p:cNvGrpSpPr/>
+        <p:nvPr/>
+      </p:nvGrpSpPr>
+      <p:grpSpPr>
+        <a:xfrm>
+          <a:off x="0" y="0"/>
+          <a:ext cx="0" cy="0"/>
+          <a:chOff x="0" y="0"/>
+          <a:chExt cx="0" cy="0"/>
+        </a:xfrm>
+      </p:grpSpPr>
+      <p:pic>
+        <p:nvPicPr>
+          <p:cNvPr id="3" name="Picture 2">
+            <a:extLst>
+              <a:ext uri="{FF2B5EF4-FFF2-40B4-BE49-F238E27FC236}">
+                <a16:creationId xmlns:a16="http://schemas.microsoft.com/office/drawing/2014/main" id="{B5E4C823-3076-E737-BD9C-9E1E0250C209}"/>
+              </a:ext>
+            </a:extLst>
+          </p:cNvPr>
+          <p:cNvPicPr>
+            <a:picLocks noChangeAspect="1"/>
+          </p:cNvPicPr>
+          <p:nvPr/>
+        </p:nvPicPr>
+        <p:blipFill>
+          <a:blip r:embed="rId2"/>
+          <a:stretch>
+            <a:fillRect/>
+          </a:stretch>
+        </p:blipFill>
+        <p:spPr>
+          <a:xfrm>
+            <a:off x="1834557" y="3690948"/>
+            <a:ext cx="7399788" cy="3028507"/>
+          </a:xfrm>
+          <a:prstGeom prst="rect">
+            <a:avLst/>
+          </a:prstGeom>
+        </p:spPr>
+      </p:pic>
+      <p:pic>
+        <p:nvPicPr>
+          <p:cNvPr id="7" name="Picture 6">
+            <a:extLst>
+              <a:ext uri="{FF2B5EF4-FFF2-40B4-BE49-F238E27FC236}">
+                <a16:creationId xmlns:a16="http://schemas.microsoft.com/office/drawing/2014/main" id="{04718C61-7734-8584-62FE-27EAA79A2988}"/>
+              </a:ext>
+            </a:extLst>
+          </p:cNvPr>
+          <p:cNvPicPr>
+            <a:picLocks noChangeAspect="1"/>
+          </p:cNvPicPr>
+          <p:nvPr/>
+        </p:nvPicPr>
+        <p:blipFill>
+          <a:blip r:embed="rId3"/>
+          <a:stretch>
+            <a:fillRect/>
+          </a:stretch>
+        </p:blipFill>
+        <p:spPr>
+          <a:xfrm>
+            <a:off x="1834557" y="138545"/>
+            <a:ext cx="7161661" cy="3018961"/>
+          </a:xfrm>
+          <a:prstGeom prst="rect">
+            <a:avLst/>
+          </a:prstGeom>
+        </p:spPr>
+      </p:pic>
+    </p:spTree>
+    <p:extLst>
+      <p:ext uri="{BB962C8B-B14F-4D97-AF65-F5344CB8AC3E}">
+        <p14:creationId xmlns:p14="http://schemas.microsoft.com/office/powerpoint/2010/main" val="3691796962"/>
+      </p:ext>
+    </p:extLst>
+  </p:cSld>
+  <p:clrMapOvr>
+    <a:masterClrMapping/>
+  </p:clrMapOvr>
+</p:sld>
+</file>
+
+<file path=ppt/slides/slide11.xml><?xml version="1.0" encoding="utf-8"?>
+<p:sld xmlns:a="http://schemas.openxmlformats.org/drawingml/2006/main" xmlns:r="http://schemas.openxmlformats.org/officeDocument/2006/relationships" xmlns:p="http://schemas.openxmlformats.org/presentationml/2006/main">
+  <p:cSld>
+    <p:spTree>
+      <p:nvGrpSpPr>
+        <p:cNvPr id="1" name="">
+          <a:extLst>
+            <a:ext uri="{FF2B5EF4-FFF2-40B4-BE49-F238E27FC236}">
+              <a16:creationId xmlns:a16="http://schemas.microsoft.com/office/drawing/2014/main" id="{163110F5-6F6D-413E-FC99-133EC870DC5D}"/>
+            </a:ext>
+          </a:extLst>
+        </p:cNvPr>
+        <p:cNvGrpSpPr/>
+        <p:nvPr/>
+      </p:nvGrpSpPr>
+      <p:grpSpPr>
+        <a:xfrm>
+          <a:off x="0" y="0"/>
+          <a:ext cx="0" cy="0"/>
+          <a:chOff x="0" y="0"/>
+          <a:chExt cx="0" cy="0"/>
+        </a:xfrm>
+      </p:grpSpPr>
+      <p:pic>
+        <p:nvPicPr>
+          <p:cNvPr id="3" name="Picture 2">
+            <a:extLst>
+              <a:ext uri="{FF2B5EF4-FFF2-40B4-BE49-F238E27FC236}">
+                <a16:creationId xmlns:a16="http://schemas.microsoft.com/office/drawing/2014/main" id="{06022873-A011-166D-D2A3-D51EE18559D6}"/>
+              </a:ext>
+            </a:extLst>
+          </p:cNvPr>
+          <p:cNvPicPr>
+            <a:picLocks noChangeAspect="1"/>
+          </p:cNvPicPr>
+          <p:nvPr/>
+        </p:nvPicPr>
+        <p:blipFill>
+          <a:blip r:embed="rId2"/>
+          <a:stretch>
+            <a:fillRect/>
+          </a:stretch>
+        </p:blipFill>
+        <p:spPr>
+          <a:xfrm>
+            <a:off x="254000" y="693111"/>
+            <a:ext cx="11684000" cy="5471777"/>
+          </a:xfrm>
+          <a:prstGeom prst="rect">
+            <a:avLst/>
+          </a:prstGeom>
+        </p:spPr>
+      </p:pic>
+      <p:pic>
+        <p:nvPicPr>
+          <p:cNvPr id="6" name="Picture 5">
+            <a:extLst>
+              <a:ext uri="{FF2B5EF4-FFF2-40B4-BE49-F238E27FC236}">
+                <a16:creationId xmlns:a16="http://schemas.microsoft.com/office/drawing/2014/main" id="{E4E6C63D-00BA-A154-51DF-A2628EB3C1DA}"/>
+              </a:ext>
+            </a:extLst>
+          </p:cNvPr>
+          <p:cNvPicPr>
+            <a:picLocks noChangeAspect="1"/>
+          </p:cNvPicPr>
+          <p:nvPr/>
+        </p:nvPicPr>
+        <p:blipFill>
+          <a:blip r:embed="rId3"/>
+          <a:stretch>
+            <a:fillRect/>
+          </a:stretch>
+        </p:blipFill>
+        <p:spPr>
+          <a:xfrm>
+            <a:off x="377352" y="1773382"/>
+            <a:ext cx="11482139" cy="411145"/>
+          </a:xfrm>
+          <a:prstGeom prst="rect">
+            <a:avLst/>
+          </a:prstGeom>
+        </p:spPr>
+      </p:pic>
+      <p:pic>
+        <p:nvPicPr>
+          <p:cNvPr id="9" name="Picture 8">
+            <a:extLst>
+              <a:ext uri="{FF2B5EF4-FFF2-40B4-BE49-F238E27FC236}">
+                <a16:creationId xmlns:a16="http://schemas.microsoft.com/office/drawing/2014/main" id="{F49B66EA-38B3-0D99-6F07-12B1C6CFE25A}"/>
+              </a:ext>
+            </a:extLst>
+          </p:cNvPr>
+          <p:cNvPicPr>
+            <a:picLocks noChangeAspect="1"/>
+          </p:cNvPicPr>
+          <p:nvPr/>
+        </p:nvPicPr>
+        <p:blipFill>
+          <a:blip r:embed="rId4"/>
+          <a:stretch>
+            <a:fillRect/>
+          </a:stretch>
+        </p:blipFill>
+        <p:spPr>
+          <a:xfrm>
+            <a:off x="377352" y="1819655"/>
+            <a:ext cx="3418793" cy="318597"/>
+          </a:xfrm>
+          <a:prstGeom prst="rect">
+            <a:avLst/>
+          </a:prstGeom>
+        </p:spPr>
+      </p:pic>
+      <p:pic>
+        <p:nvPicPr>
+          <p:cNvPr id="13" name="Picture 12">
+            <a:extLst>
+              <a:ext uri="{FF2B5EF4-FFF2-40B4-BE49-F238E27FC236}">
+                <a16:creationId xmlns:a16="http://schemas.microsoft.com/office/drawing/2014/main" id="{69E1D7C4-37B8-1B09-D6D6-18ACC6E39440}"/>
+              </a:ext>
+            </a:extLst>
+          </p:cNvPr>
+          <p:cNvPicPr>
+            <a:picLocks noChangeAspect="1"/>
+          </p:cNvPicPr>
+          <p:nvPr/>
+        </p:nvPicPr>
+        <p:blipFill>
+          <a:blip r:embed="rId5"/>
+          <a:stretch>
+            <a:fillRect/>
+          </a:stretch>
+        </p:blipFill>
+        <p:spPr>
+          <a:xfrm>
+            <a:off x="5158957" y="1818919"/>
+            <a:ext cx="1918927" cy="320068"/>
+          </a:xfrm>
+          <a:prstGeom prst="rect">
+            <a:avLst/>
+          </a:prstGeom>
+        </p:spPr>
+      </p:pic>
+      <p:pic>
+        <p:nvPicPr>
+          <p:cNvPr id="15" name="Picture 14">
+            <a:extLst>
+              <a:ext uri="{FF2B5EF4-FFF2-40B4-BE49-F238E27FC236}">
+                <a16:creationId xmlns:a16="http://schemas.microsoft.com/office/drawing/2014/main" id="{6B85C64C-053B-C22C-249D-25A5FEEC375D}"/>
+              </a:ext>
+            </a:extLst>
+          </p:cNvPr>
+          <p:cNvPicPr>
+            <a:picLocks noChangeAspect="1"/>
+          </p:cNvPicPr>
+          <p:nvPr/>
+        </p:nvPicPr>
+        <p:blipFill>
+          <a:blip r:embed="rId6"/>
+          <a:stretch>
+            <a:fillRect/>
+          </a:stretch>
+        </p:blipFill>
+        <p:spPr>
+          <a:xfrm>
+            <a:off x="8922327" y="1792746"/>
+            <a:ext cx="2892321" cy="413984"/>
+          </a:xfrm>
+          <a:prstGeom prst="rect">
+            <a:avLst/>
+          </a:prstGeom>
+        </p:spPr>
+      </p:pic>
+    </p:spTree>
+    <p:extLst>
+      <p:ext uri="{BB962C8B-B14F-4D97-AF65-F5344CB8AC3E}">
+        <p14:creationId xmlns:p14="http://schemas.microsoft.com/office/powerpoint/2010/main" val="1654078093"/>
+      </p:ext>
+    </p:extLst>
+  </p:cSld>
+  <p:clrMapOvr>
+    <a:masterClrMapping/>
+  </p:clrMapOvr>
+</p:sld>
+</file>
+
+<file path=ppt/slides/slide12.xml><?xml version="1.0" encoding="utf-8"?>
+<p:sld xmlns:a="http://schemas.openxmlformats.org/drawingml/2006/main" xmlns:r="http://schemas.openxmlformats.org/officeDocument/2006/relationships" xmlns:p="http://schemas.openxmlformats.org/presentationml/2006/main">
+  <p:cSld>
+    <p:spTree>
+      <p:nvGrpSpPr>
+        <p:cNvPr id="1" name="">
+          <a:extLst>
+            <a:ext uri="{FF2B5EF4-FFF2-40B4-BE49-F238E27FC236}">
+              <a16:creationId xmlns:a16="http://schemas.microsoft.com/office/drawing/2014/main" id="{613E1468-512E-D483-8B23-3F382B04231B}"/>
+            </a:ext>
+          </a:extLst>
+        </p:cNvPr>
+        <p:cNvGrpSpPr/>
+        <p:nvPr/>
+      </p:nvGrpSpPr>
+      <p:grpSpPr>
+        <a:xfrm>
+          <a:off x="0" y="0"/>
+          <a:ext cx="0" cy="0"/>
+          <a:chOff x="0" y="0"/>
+          <a:chExt cx="0" cy="0"/>
+        </a:xfrm>
+      </p:grpSpPr>
+      <p:pic>
+        <p:nvPicPr>
+          <p:cNvPr id="18" name="Picture 17">
+            <a:extLst>
+              <a:ext uri="{FF2B5EF4-FFF2-40B4-BE49-F238E27FC236}">
+                <a16:creationId xmlns:a16="http://schemas.microsoft.com/office/drawing/2014/main" id="{596D81BC-4A09-9F46-92CD-B86B0CCEEA35}"/>
+              </a:ext>
+            </a:extLst>
+          </p:cNvPr>
+          <p:cNvPicPr>
+            <a:picLocks noChangeAspect="1"/>
+          </p:cNvPicPr>
+          <p:nvPr/>
+        </p:nvPicPr>
+        <p:blipFill>
+          <a:blip r:embed="rId3"/>
+          <a:stretch>
+            <a:fillRect/>
+          </a:stretch>
+        </p:blipFill>
+        <p:spPr>
+          <a:xfrm>
+            <a:off x="1167800" y="397769"/>
+            <a:ext cx="9856400" cy="4561693"/>
+          </a:xfrm>
+          <a:prstGeom prst="rect">
+            <a:avLst/>
+          </a:prstGeom>
+        </p:spPr>
+      </p:pic>
+      <p:pic>
+        <p:nvPicPr>
+          <p:cNvPr id="20" name="Picture 19">
+            <a:extLst>
+              <a:ext uri="{FF2B5EF4-FFF2-40B4-BE49-F238E27FC236}">
+                <a16:creationId xmlns:a16="http://schemas.microsoft.com/office/drawing/2014/main" id="{ADCD799A-D444-D2C4-64C8-E5350B9EFC61}"/>
+              </a:ext>
+            </a:extLst>
+          </p:cNvPr>
+          <p:cNvPicPr>
+            <a:picLocks noChangeAspect="1"/>
+          </p:cNvPicPr>
+          <p:nvPr/>
+        </p:nvPicPr>
+        <p:blipFill>
+          <a:blip r:embed="rId4"/>
+          <a:stretch>
+            <a:fillRect/>
+          </a:stretch>
+        </p:blipFill>
+        <p:spPr>
+          <a:xfrm>
+            <a:off x="3064213" y="4959462"/>
+            <a:ext cx="7855704" cy="1711704"/>
+          </a:xfrm>
+          <a:prstGeom prst="rect">
+            <a:avLst/>
+          </a:prstGeom>
+        </p:spPr>
+      </p:pic>
+    </p:spTree>
+    <p:extLst>
+      <p:ext uri="{BB962C8B-B14F-4D97-AF65-F5344CB8AC3E}">
+        <p14:creationId xmlns:p14="http://schemas.microsoft.com/office/powerpoint/2010/main" val="1649722496"/>
+      </p:ext>
+    </p:extLst>
+  </p:cSld>
+  <p:clrMapOvr>
+    <a:masterClrMapping/>
+  </p:clrMapOvr>
+</p:sld>
+</file>
+
+<file path=ppt/slides/slide13.xml><?xml version="1.0" encoding="utf-8"?>
+<p:sld xmlns:a="http://schemas.openxmlformats.org/drawingml/2006/main" xmlns:r="http://schemas.openxmlformats.org/officeDocument/2006/relationships" xmlns:p="http://schemas.openxmlformats.org/presentationml/2006/main">
+  <p:cSld>
+    <p:spTree>
+      <p:nvGrpSpPr>
+        <p:cNvPr id="1" name="">
+          <a:extLst>
+            <a:ext uri="{FF2B5EF4-FFF2-40B4-BE49-F238E27FC236}">
+              <a16:creationId xmlns:a16="http://schemas.microsoft.com/office/drawing/2014/main" id="{613E1468-512E-D483-8B23-3F382B04231B}"/>
+            </a:ext>
+          </a:extLst>
+        </p:cNvPr>
+        <p:cNvGrpSpPr/>
+        <p:nvPr/>
+      </p:nvGrpSpPr>
+      <p:grpSpPr>
+        <a:xfrm>
+          <a:off x="0" y="0"/>
+          <a:ext cx="0" cy="0"/>
+          <a:chOff x="0" y="0"/>
+          <a:chExt cx="0" cy="0"/>
+        </a:xfrm>
+      </p:grpSpPr>
+      <p:pic>
+        <p:nvPicPr>
+          <p:cNvPr id="3" name="Picture 2">
+            <a:extLst>
+              <a:ext uri="{FF2B5EF4-FFF2-40B4-BE49-F238E27FC236}">
+                <a16:creationId xmlns:a16="http://schemas.microsoft.com/office/drawing/2014/main" id="{82DAF03B-F2C1-CC6C-2011-C7790721DA07}"/>
+              </a:ext>
+            </a:extLst>
+          </p:cNvPr>
+          <p:cNvPicPr>
+            <a:picLocks noChangeAspect="1"/>
+          </p:cNvPicPr>
+          <p:nvPr/>
+        </p:nvPicPr>
+        <p:blipFill>
+          <a:blip r:embed="rId3"/>
+          <a:srcRect b="21528"/>
+          <a:stretch>
+            <a:fillRect/>
+          </a:stretch>
+        </p:blipFill>
+        <p:spPr>
+          <a:xfrm>
+            <a:off x="0" y="592152"/>
+            <a:ext cx="12192000" cy="4452288"/>
+          </a:xfrm>
+          <a:prstGeom prst="rect">
+            <a:avLst/>
+          </a:prstGeom>
+        </p:spPr>
+      </p:pic>
+      <p:sp>
+        <p:nvSpPr>
+          <p:cNvPr id="4" name="Rectangle 3">
+            <a:extLst>
+              <a:ext uri="{FF2B5EF4-FFF2-40B4-BE49-F238E27FC236}">
+                <a16:creationId xmlns:a16="http://schemas.microsoft.com/office/drawing/2014/main" id="{1A347928-C4DF-A1D6-849E-A47A9F8F79C9}"/>
+              </a:ext>
+            </a:extLst>
+          </p:cNvPr>
+          <p:cNvSpPr/>
+          <p:nvPr/>
+        </p:nvSpPr>
+        <p:spPr>
+          <a:xfrm>
+            <a:off x="1478280" y="4434840"/>
+            <a:ext cx="9791700" cy="281940"/>
+          </a:xfrm>
+          <a:prstGeom prst="rect">
+            <a:avLst/>
+          </a:prstGeom>
+          <a:solidFill>
+            <a:schemeClr val="bg1"/>
+          </a:solidFill>
+          <a:ln>
+            <a:solidFill>
+              <a:schemeClr val="bg1"/>
+            </a:solidFill>
+          </a:ln>
+        </p:spPr>
+        <p:style>
+          <a:lnRef idx="2">
+            <a:schemeClr val="accent1">
+              <a:shade val="15000"/>
+            </a:schemeClr>
+          </a:lnRef>
+          <a:fillRef idx="1">
+            <a:schemeClr val="accent1"/>
+          </a:fillRef>
+          <a:effectRef idx="0">
+            <a:schemeClr val="accent1"/>
+          </a:effectRef>
+          <a:fontRef idx="minor">
+            <a:schemeClr val="lt1"/>
+          </a:fontRef>
+        </p:style>
+        <p:txBody>
+          <a:bodyPr rtlCol="0" anchor="ctr"/>
+          <a:lstStyle/>
+          <a:p>
+            <a:pPr algn="ctr"/>
+            <a:endParaRPr lang="en-US"/>
+          </a:p>
+        </p:txBody>
+      </p:sp>
+      <p:pic>
+        <p:nvPicPr>
+          <p:cNvPr id="6" name="Picture 5">
+            <a:extLst>
+              <a:ext uri="{FF2B5EF4-FFF2-40B4-BE49-F238E27FC236}">
+                <a16:creationId xmlns:a16="http://schemas.microsoft.com/office/drawing/2014/main" id="{699CC983-AD80-9789-4BA4-884172C145B7}"/>
+              </a:ext>
+            </a:extLst>
+          </p:cNvPr>
+          <p:cNvPicPr>
+            <a:picLocks noChangeAspect="1"/>
+          </p:cNvPicPr>
+          <p:nvPr/>
+        </p:nvPicPr>
+        <p:blipFill>
+          <a:blip r:embed="rId4"/>
+          <a:stretch>
+            <a:fillRect/>
+          </a:stretch>
+        </p:blipFill>
+        <p:spPr>
+          <a:xfrm>
+            <a:off x="1478280" y="4434840"/>
+            <a:ext cx="7986259" cy="343112"/>
+          </a:xfrm>
+          <a:prstGeom prst="rect">
+            <a:avLst/>
+          </a:prstGeom>
+        </p:spPr>
+      </p:pic>
+      <p:pic>
+        <p:nvPicPr>
+          <p:cNvPr id="7" name="Picture 6">
+            <a:extLst>
+              <a:ext uri="{FF2B5EF4-FFF2-40B4-BE49-F238E27FC236}">
+                <a16:creationId xmlns:a16="http://schemas.microsoft.com/office/drawing/2014/main" id="{6D44F9E4-22D9-5425-4E57-954D4A5E66EC}"/>
+              </a:ext>
+            </a:extLst>
+          </p:cNvPr>
+          <p:cNvPicPr>
+            <a:picLocks noChangeAspect="1"/>
+          </p:cNvPicPr>
+          <p:nvPr/>
+        </p:nvPicPr>
+        <p:blipFill>
+          <a:blip r:embed="rId3"/>
+          <a:srcRect t="79278"/>
+          <a:stretch>
+            <a:fillRect/>
+          </a:stretch>
+        </p:blipFill>
+        <p:spPr>
+          <a:xfrm>
+            <a:off x="0" y="5276850"/>
+            <a:ext cx="12192000" cy="1175688"/>
+          </a:xfrm>
+          <a:prstGeom prst="rect">
+            <a:avLst/>
+          </a:prstGeom>
+        </p:spPr>
+      </p:pic>
+      <p:pic>
+        <p:nvPicPr>
+          <p:cNvPr id="8" name="Picture 7">
+            <a:extLst>
+              <a:ext uri="{FF2B5EF4-FFF2-40B4-BE49-F238E27FC236}">
+                <a16:creationId xmlns:a16="http://schemas.microsoft.com/office/drawing/2014/main" id="{8C5AEB47-647F-9F34-5132-A54C343C5714}"/>
+              </a:ext>
+            </a:extLst>
+          </p:cNvPr>
+          <p:cNvPicPr>
+            <a:picLocks noChangeAspect="1"/>
+          </p:cNvPicPr>
+          <p:nvPr/>
+        </p:nvPicPr>
+        <p:blipFill>
+          <a:blip r:embed="rId5"/>
+          <a:srcRect t="1404" b="78551"/>
+          <a:stretch>
+            <a:fillRect/>
+          </a:stretch>
+        </p:blipFill>
+        <p:spPr>
+          <a:xfrm>
+            <a:off x="1478280" y="5048038"/>
+            <a:ext cx="9517837" cy="343112"/>
+          </a:xfrm>
+          <a:prstGeom prst="rect">
+            <a:avLst/>
+          </a:prstGeom>
+        </p:spPr>
+      </p:pic>
+      <p:sp>
+        <p:nvSpPr>
+          <p:cNvPr id="9" name="TextBox 8">
+            <a:extLst>
+              <a:ext uri="{FF2B5EF4-FFF2-40B4-BE49-F238E27FC236}">
+                <a16:creationId xmlns:a16="http://schemas.microsoft.com/office/drawing/2014/main" id="{1633556E-68F2-9723-C725-FB4913D0DC62}"/>
+              </a:ext>
+            </a:extLst>
+          </p:cNvPr>
+          <p:cNvSpPr txBox="1"/>
+          <p:nvPr/>
+        </p:nvSpPr>
+        <p:spPr>
+          <a:xfrm>
+            <a:off x="9464539" y="4434840"/>
+            <a:ext cx="1866401" cy="430887"/>
+          </a:xfrm>
+          <a:prstGeom prst="rect">
+            <a:avLst/>
+          </a:prstGeom>
+          <a:noFill/>
+          <a:ln>
+            <a:solidFill>
+              <a:schemeClr val="bg1">
+                <a:lumMod val="85000"/>
+              </a:schemeClr>
+            </a:solidFill>
+          </a:ln>
+        </p:spPr>
+        <p:txBody>
+          <a:bodyPr wrap="square" rtlCol="0">
+            <a:spAutoFit/>
+          </a:bodyPr>
+          <a:lstStyle/>
+          <a:p>
+            <a:pPr algn="ctr"/>
+            <a:r>
+              <a:rPr lang="en-US" sz="1100">
+                <a:solidFill>
+                  <a:schemeClr val="accent2">
+                    <a:lumMod val="60000"/>
+                    <a:lumOff val="40000"/>
+                  </a:schemeClr>
+                </a:solidFill>
+              </a:rPr>
+              <a:t>[harga ambil data dari tb gedung]</a:t>
+            </a:r>
+          </a:p>
+        </p:txBody>
+      </p:sp>
+    </p:spTree>
+    <p:extLst>
+      <p:ext uri="{BB962C8B-B14F-4D97-AF65-F5344CB8AC3E}">
+        <p14:creationId xmlns:p14="http://schemas.microsoft.com/office/powerpoint/2010/main" val="560037392"/>
+      </p:ext>
+    </p:extLst>
+  </p:cSld>
+  <p:clrMapOvr>
+    <a:masterClrMapping/>
+  </p:clrMapOvr>
+</p:sld>
+</file>
+
+<file path=ppt/slides/slide2.xml><?xml version="1.0" encoding="utf-8"?>
+<p:sld xmlns:a="http://schemas.openxmlformats.org/drawingml/2006/main" xmlns:r="http://schemas.openxmlformats.org/officeDocument/2006/relationships" xmlns:p="http://schemas.openxmlformats.org/presentationml/2006/main">
+  <p:cSld>
+    <p:spTree>
+      <p:nvGrpSpPr>
+        <p:cNvPr id="1" name="">
+          <a:extLst>
+            <a:ext uri="{FF2B5EF4-FFF2-40B4-BE49-F238E27FC236}">
+              <a16:creationId xmlns:a16="http://schemas.microsoft.com/office/drawing/2014/main" id="{163110F5-6F6D-413E-FC99-133EC870DC5D}"/>
+            </a:ext>
+          </a:extLst>
+        </p:cNvPr>
+        <p:cNvGrpSpPr/>
+        <p:nvPr/>
+      </p:nvGrpSpPr>
+      <p:grpSpPr>
+        <a:xfrm>
+          <a:off x="0" y="0"/>
+          <a:ext cx="0" cy="0"/>
+          <a:chOff x="0" y="0"/>
+          <a:chExt cx="0" cy="0"/>
+        </a:xfrm>
+      </p:grpSpPr>
+      <p:pic>
+        <p:nvPicPr>
+          <p:cNvPr id="7" name="Picture 6">
+            <a:extLst>
+              <a:ext uri="{FF2B5EF4-FFF2-40B4-BE49-F238E27FC236}">
+                <a16:creationId xmlns:a16="http://schemas.microsoft.com/office/drawing/2014/main" id="{530F1051-F6CB-E974-2C26-D92C730EEC06}"/>
+              </a:ext>
+            </a:extLst>
+          </p:cNvPr>
+          <p:cNvPicPr>
+            <a:picLocks noChangeAspect="1"/>
+          </p:cNvPicPr>
+          <p:nvPr/>
+        </p:nvPicPr>
+        <p:blipFill>
+          <a:blip r:embed="rId2"/>
+          <a:stretch>
+            <a:fillRect/>
+          </a:stretch>
+        </p:blipFill>
+        <p:spPr>
+          <a:xfrm>
+            <a:off x="1678081" y="2330506"/>
+            <a:ext cx="5837841" cy="2832220"/>
+          </a:xfrm>
+          <a:prstGeom prst="rect">
+            <a:avLst/>
+          </a:prstGeom>
+        </p:spPr>
+      </p:pic>
+      <p:pic>
+        <p:nvPicPr>
+          <p:cNvPr id="3" name="Picture 2">
+            <a:extLst>
+              <a:ext uri="{FF2B5EF4-FFF2-40B4-BE49-F238E27FC236}">
+                <a16:creationId xmlns:a16="http://schemas.microsoft.com/office/drawing/2014/main" id="{B315D65E-6852-8704-8E20-76D5B0609BB0}"/>
+              </a:ext>
+            </a:extLst>
+          </p:cNvPr>
+          <p:cNvPicPr>
+            <a:picLocks noChangeAspect="1"/>
+          </p:cNvPicPr>
+          <p:nvPr/>
+        </p:nvPicPr>
+        <p:blipFill>
+          <a:blip r:embed="rId3"/>
+          <a:stretch>
+            <a:fillRect/>
+          </a:stretch>
+        </p:blipFill>
+        <p:spPr>
+          <a:xfrm>
+            <a:off x="1741593" y="53567"/>
+            <a:ext cx="7670036" cy="2129222"/>
+          </a:xfrm>
+          <a:prstGeom prst="rect">
+            <a:avLst/>
+          </a:prstGeom>
+        </p:spPr>
+      </p:pic>
+      <p:pic>
+        <p:nvPicPr>
+          <p:cNvPr id="5" name="Picture 4">
+            <a:extLst>
+              <a:ext uri="{FF2B5EF4-FFF2-40B4-BE49-F238E27FC236}">
+                <a16:creationId xmlns:a16="http://schemas.microsoft.com/office/drawing/2014/main" id="{E3DDFFD6-A23D-82F8-27E4-22D010CAB768}"/>
+              </a:ext>
+            </a:extLst>
+          </p:cNvPr>
+          <p:cNvPicPr>
+            <a:picLocks noChangeAspect="1"/>
+          </p:cNvPicPr>
+          <p:nvPr/>
+        </p:nvPicPr>
+        <p:blipFill>
+          <a:blip r:embed="rId4"/>
+          <a:stretch>
+            <a:fillRect/>
+          </a:stretch>
+        </p:blipFill>
+        <p:spPr>
+          <a:xfrm>
+            <a:off x="7515922" y="2330499"/>
+            <a:ext cx="2029380" cy="2979944"/>
+          </a:xfrm>
+          <a:prstGeom prst="rect">
+            <a:avLst/>
+          </a:prstGeom>
+        </p:spPr>
+      </p:pic>
+      <p:pic>
+        <p:nvPicPr>
+          <p:cNvPr id="8" name="Picture 7">
+            <a:extLst>
+              <a:ext uri="{FF2B5EF4-FFF2-40B4-BE49-F238E27FC236}">
+                <a16:creationId xmlns:a16="http://schemas.microsoft.com/office/drawing/2014/main" id="{7A959FA7-EFCC-FE58-2B10-AE50041E7613}"/>
+              </a:ext>
+            </a:extLst>
+          </p:cNvPr>
+          <p:cNvPicPr>
+            <a:picLocks noChangeAspect="1"/>
+          </p:cNvPicPr>
+          <p:nvPr/>
+        </p:nvPicPr>
+        <p:blipFill>
+          <a:blip r:embed="rId5"/>
+          <a:stretch>
+            <a:fillRect/>
+          </a:stretch>
+        </p:blipFill>
+        <p:spPr>
+          <a:xfrm>
+            <a:off x="1741593" y="5580818"/>
+            <a:ext cx="7886310" cy="482940"/>
+          </a:xfrm>
+          <a:prstGeom prst="rect">
+            <a:avLst/>
+          </a:prstGeom>
+        </p:spPr>
+      </p:pic>
+    </p:spTree>
+    <p:extLst>
+      <p:ext uri="{BB962C8B-B14F-4D97-AF65-F5344CB8AC3E}">
+        <p14:creationId xmlns:p14="http://schemas.microsoft.com/office/powerpoint/2010/main" val="3518731333"/>
+      </p:ext>
+    </p:extLst>
+  </p:cSld>
+  <p:clrMapOvr>
+    <a:masterClrMapping/>
+  </p:clrMapOvr>
+</p:sld>
+</file>
+
+<file path=ppt/slides/slide3.xml><?xml version="1.0" encoding="utf-8"?>
+<p:sld xmlns:a="http://schemas.openxmlformats.org/drawingml/2006/main" xmlns:r="http://schemas.openxmlformats.org/officeDocument/2006/relationships" xmlns:p="http://schemas.openxmlformats.org/presentationml/2006/main">
+  <p:cSld>
+    <p:spTree>
+      <p:nvGrpSpPr>
+        <p:cNvPr id="1" name="">
+          <a:extLst>
+            <a:ext uri="{FF2B5EF4-FFF2-40B4-BE49-F238E27FC236}">
+              <a16:creationId xmlns:a16="http://schemas.microsoft.com/office/drawing/2014/main" id="{163110F5-6F6D-413E-FC99-133EC870DC5D}"/>
+            </a:ext>
+          </a:extLst>
+        </p:cNvPr>
+        <p:cNvGrpSpPr/>
+        <p:nvPr/>
+      </p:nvGrpSpPr>
+      <p:grpSpPr>
+        <a:xfrm>
+          <a:off x="0" y="0"/>
+          <a:ext cx="0" cy="0"/>
+          <a:chOff x="0" y="0"/>
+          <a:chExt cx="0" cy="0"/>
+        </a:xfrm>
+      </p:grpSpPr>
+      <p:pic>
+        <p:nvPicPr>
           <p:cNvPr id="4" name="Picture 3">
             <a:extLst>
               <a:ext uri="{FF2B5EF4-FFF2-40B4-BE49-F238E27FC236}">
@@ -3964,13 +6447,7 @@
           <p:cNvGraphicFramePr>
             <a:graphicFrameLocks noGrp="1"/>
           </p:cNvGraphicFramePr>
-          <p:nvPr>
-            <p:extLst>
-              <p:ext uri="{D42A27DB-BD31-4B8C-83A1-F6EECF244321}">
-                <p14:modId xmlns:p14="http://schemas.microsoft.com/office/powerpoint/2010/main" val="3165002608"/>
-              </p:ext>
-            </p:extLst>
-          </p:nvPr>
+          <p:nvPr/>
         </p:nvGraphicFramePr>
         <p:xfrm>
           <a:off x="1425910" y="4295139"/>
@@ -4661,7 +7138,7 @@
     </p:spTree>
     <p:extLst>
       <p:ext uri="{BB962C8B-B14F-4D97-AF65-F5344CB8AC3E}">
-        <p14:creationId xmlns:p14="http://schemas.microsoft.com/office/powerpoint/2010/main" val="1597641754"/>
+        <p14:creationId xmlns:p14="http://schemas.microsoft.com/office/powerpoint/2010/main" val="2609340924"/>
       </p:ext>
     </p:extLst>
   </p:cSld>
@@ -4671,366 +7148,7 @@
 </p:sld>
 </file>
 
-<file path=ppt/slides/slide10.xml><?xml version="1.0" encoding="utf-8"?>
-<p:sld xmlns:a="http://schemas.openxmlformats.org/drawingml/2006/main" xmlns:r="http://schemas.openxmlformats.org/officeDocument/2006/relationships" xmlns:p="http://schemas.openxmlformats.org/presentationml/2006/main">
-  <p:cSld>
-    <p:spTree>
-      <p:nvGrpSpPr>
-        <p:cNvPr id="1" name="">
-          <a:extLst>
-            <a:ext uri="{FF2B5EF4-FFF2-40B4-BE49-F238E27FC236}">
-              <a16:creationId xmlns:a16="http://schemas.microsoft.com/office/drawing/2014/main" id="{613E1468-512E-D483-8B23-3F382B04231B}"/>
-            </a:ext>
-          </a:extLst>
-        </p:cNvPr>
-        <p:cNvGrpSpPr/>
-        <p:nvPr/>
-      </p:nvGrpSpPr>
-      <p:grpSpPr>
-        <a:xfrm>
-          <a:off x="0" y="0"/>
-          <a:ext cx="0" cy="0"/>
-          <a:chOff x="0" y="0"/>
-          <a:chExt cx="0" cy="0"/>
-        </a:xfrm>
-      </p:grpSpPr>
-      <p:pic>
-        <p:nvPicPr>
-          <p:cNvPr id="18" name="Picture 17">
-            <a:extLst>
-              <a:ext uri="{FF2B5EF4-FFF2-40B4-BE49-F238E27FC236}">
-                <a16:creationId xmlns:a16="http://schemas.microsoft.com/office/drawing/2014/main" id="{596D81BC-4A09-9F46-92CD-B86B0CCEEA35}"/>
-              </a:ext>
-            </a:extLst>
-          </p:cNvPr>
-          <p:cNvPicPr>
-            <a:picLocks noChangeAspect="1"/>
-          </p:cNvPicPr>
-          <p:nvPr/>
-        </p:nvPicPr>
-        <p:blipFill>
-          <a:blip r:embed="rId3"/>
-          <a:stretch>
-            <a:fillRect/>
-          </a:stretch>
-        </p:blipFill>
-        <p:spPr>
-          <a:xfrm>
-            <a:off x="1167800" y="397769"/>
-            <a:ext cx="9856400" cy="4561693"/>
-          </a:xfrm>
-          <a:prstGeom prst="rect">
-            <a:avLst/>
-          </a:prstGeom>
-        </p:spPr>
-      </p:pic>
-      <p:pic>
-        <p:nvPicPr>
-          <p:cNvPr id="20" name="Picture 19">
-            <a:extLst>
-              <a:ext uri="{FF2B5EF4-FFF2-40B4-BE49-F238E27FC236}">
-                <a16:creationId xmlns:a16="http://schemas.microsoft.com/office/drawing/2014/main" id="{ADCD799A-D444-D2C4-64C8-E5350B9EFC61}"/>
-              </a:ext>
-            </a:extLst>
-          </p:cNvPr>
-          <p:cNvPicPr>
-            <a:picLocks noChangeAspect="1"/>
-          </p:cNvPicPr>
-          <p:nvPr/>
-        </p:nvPicPr>
-        <p:blipFill>
-          <a:blip r:embed="rId4"/>
-          <a:stretch>
-            <a:fillRect/>
-          </a:stretch>
-        </p:blipFill>
-        <p:spPr>
-          <a:xfrm>
-            <a:off x="3064213" y="4959462"/>
-            <a:ext cx="7855704" cy="1711704"/>
-          </a:xfrm>
-          <a:prstGeom prst="rect">
-            <a:avLst/>
-          </a:prstGeom>
-        </p:spPr>
-      </p:pic>
-    </p:spTree>
-    <p:extLst>
-      <p:ext uri="{BB962C8B-B14F-4D97-AF65-F5344CB8AC3E}">
-        <p14:creationId xmlns:p14="http://schemas.microsoft.com/office/powerpoint/2010/main" val="1649722496"/>
-      </p:ext>
-    </p:extLst>
-  </p:cSld>
-  <p:clrMapOvr>
-    <a:masterClrMapping/>
-  </p:clrMapOvr>
-</p:sld>
-</file>
-
-<file path=ppt/slides/slide11.xml><?xml version="1.0" encoding="utf-8"?>
-<p:sld xmlns:a="http://schemas.openxmlformats.org/drawingml/2006/main" xmlns:r="http://schemas.openxmlformats.org/officeDocument/2006/relationships" xmlns:p="http://schemas.openxmlformats.org/presentationml/2006/main">
-  <p:cSld>
-    <p:spTree>
-      <p:nvGrpSpPr>
-        <p:cNvPr id="1" name="">
-          <a:extLst>
-            <a:ext uri="{FF2B5EF4-FFF2-40B4-BE49-F238E27FC236}">
-              <a16:creationId xmlns:a16="http://schemas.microsoft.com/office/drawing/2014/main" id="{613E1468-512E-D483-8B23-3F382B04231B}"/>
-            </a:ext>
-          </a:extLst>
-        </p:cNvPr>
-        <p:cNvGrpSpPr/>
-        <p:nvPr/>
-      </p:nvGrpSpPr>
-      <p:grpSpPr>
-        <a:xfrm>
-          <a:off x="0" y="0"/>
-          <a:ext cx="0" cy="0"/>
-          <a:chOff x="0" y="0"/>
-          <a:chExt cx="0" cy="0"/>
-        </a:xfrm>
-      </p:grpSpPr>
-      <p:pic>
-        <p:nvPicPr>
-          <p:cNvPr id="3" name="Picture 2">
-            <a:extLst>
-              <a:ext uri="{FF2B5EF4-FFF2-40B4-BE49-F238E27FC236}">
-                <a16:creationId xmlns:a16="http://schemas.microsoft.com/office/drawing/2014/main" id="{82DAF03B-F2C1-CC6C-2011-C7790721DA07}"/>
-              </a:ext>
-            </a:extLst>
-          </p:cNvPr>
-          <p:cNvPicPr>
-            <a:picLocks noChangeAspect="1"/>
-          </p:cNvPicPr>
-          <p:nvPr/>
-        </p:nvPicPr>
-        <p:blipFill>
-          <a:blip r:embed="rId3"/>
-          <a:srcRect b="21528"/>
-          <a:stretch>
-            <a:fillRect/>
-          </a:stretch>
-        </p:blipFill>
-        <p:spPr>
-          <a:xfrm>
-            <a:off x="0" y="592152"/>
-            <a:ext cx="12192000" cy="4452288"/>
-          </a:xfrm>
-          <a:prstGeom prst="rect">
-            <a:avLst/>
-          </a:prstGeom>
-        </p:spPr>
-      </p:pic>
-      <p:sp>
-        <p:nvSpPr>
-          <p:cNvPr id="4" name="Rectangle 3">
-            <a:extLst>
-              <a:ext uri="{FF2B5EF4-FFF2-40B4-BE49-F238E27FC236}">
-                <a16:creationId xmlns:a16="http://schemas.microsoft.com/office/drawing/2014/main" id="{1A347928-C4DF-A1D6-849E-A47A9F8F79C9}"/>
-              </a:ext>
-            </a:extLst>
-          </p:cNvPr>
-          <p:cNvSpPr/>
-          <p:nvPr/>
-        </p:nvSpPr>
-        <p:spPr>
-          <a:xfrm>
-            <a:off x="1478280" y="4434840"/>
-            <a:ext cx="9791700" cy="281940"/>
-          </a:xfrm>
-          <a:prstGeom prst="rect">
-            <a:avLst/>
-          </a:prstGeom>
-          <a:solidFill>
-            <a:schemeClr val="bg1"/>
-          </a:solidFill>
-          <a:ln>
-            <a:solidFill>
-              <a:schemeClr val="bg1"/>
-            </a:solidFill>
-          </a:ln>
-        </p:spPr>
-        <p:style>
-          <a:lnRef idx="2">
-            <a:schemeClr val="accent1">
-              <a:shade val="15000"/>
-            </a:schemeClr>
-          </a:lnRef>
-          <a:fillRef idx="1">
-            <a:schemeClr val="accent1"/>
-          </a:fillRef>
-          <a:effectRef idx="0">
-            <a:schemeClr val="accent1"/>
-          </a:effectRef>
-          <a:fontRef idx="minor">
-            <a:schemeClr val="lt1"/>
-          </a:fontRef>
-        </p:style>
-        <p:txBody>
-          <a:bodyPr rtlCol="0" anchor="ctr"/>
-          <a:lstStyle/>
-          <a:p>
-            <a:pPr algn="ctr"/>
-            <a:endParaRPr lang="en-US"/>
-          </a:p>
-        </p:txBody>
-      </p:sp>
-      <p:pic>
-        <p:nvPicPr>
-          <p:cNvPr id="6" name="Picture 5">
-            <a:extLst>
-              <a:ext uri="{FF2B5EF4-FFF2-40B4-BE49-F238E27FC236}">
-                <a16:creationId xmlns:a16="http://schemas.microsoft.com/office/drawing/2014/main" id="{699CC983-AD80-9789-4BA4-884172C145B7}"/>
-              </a:ext>
-            </a:extLst>
-          </p:cNvPr>
-          <p:cNvPicPr>
-            <a:picLocks noChangeAspect="1"/>
-          </p:cNvPicPr>
-          <p:nvPr/>
-        </p:nvPicPr>
-        <p:blipFill>
-          <a:blip r:embed="rId4"/>
-          <a:stretch>
-            <a:fillRect/>
-          </a:stretch>
-        </p:blipFill>
-        <p:spPr>
-          <a:xfrm>
-            <a:off x="1478280" y="4434840"/>
-            <a:ext cx="7986259" cy="343112"/>
-          </a:xfrm>
-          <a:prstGeom prst="rect">
-            <a:avLst/>
-          </a:prstGeom>
-        </p:spPr>
-      </p:pic>
-      <p:pic>
-        <p:nvPicPr>
-          <p:cNvPr id="7" name="Picture 6">
-            <a:extLst>
-              <a:ext uri="{FF2B5EF4-FFF2-40B4-BE49-F238E27FC236}">
-                <a16:creationId xmlns:a16="http://schemas.microsoft.com/office/drawing/2014/main" id="{6D44F9E4-22D9-5425-4E57-954D4A5E66EC}"/>
-              </a:ext>
-            </a:extLst>
-          </p:cNvPr>
-          <p:cNvPicPr>
-            <a:picLocks noChangeAspect="1"/>
-          </p:cNvPicPr>
-          <p:nvPr/>
-        </p:nvPicPr>
-        <p:blipFill>
-          <a:blip r:embed="rId3"/>
-          <a:srcRect t="79278"/>
-          <a:stretch>
-            <a:fillRect/>
-          </a:stretch>
-        </p:blipFill>
-        <p:spPr>
-          <a:xfrm>
-            <a:off x="0" y="5276850"/>
-            <a:ext cx="12192000" cy="1175688"/>
-          </a:xfrm>
-          <a:prstGeom prst="rect">
-            <a:avLst/>
-          </a:prstGeom>
-        </p:spPr>
-      </p:pic>
-      <p:pic>
-        <p:nvPicPr>
-          <p:cNvPr id="8" name="Picture 7">
-            <a:extLst>
-              <a:ext uri="{FF2B5EF4-FFF2-40B4-BE49-F238E27FC236}">
-                <a16:creationId xmlns:a16="http://schemas.microsoft.com/office/drawing/2014/main" id="{8C5AEB47-647F-9F34-5132-A54C343C5714}"/>
-              </a:ext>
-            </a:extLst>
-          </p:cNvPr>
-          <p:cNvPicPr>
-            <a:picLocks noChangeAspect="1"/>
-          </p:cNvPicPr>
-          <p:nvPr/>
-        </p:nvPicPr>
-        <p:blipFill>
-          <a:blip r:embed="rId5"/>
-          <a:srcRect t="1404" b="78551"/>
-          <a:stretch>
-            <a:fillRect/>
-          </a:stretch>
-        </p:blipFill>
-        <p:spPr>
-          <a:xfrm>
-            <a:off x="1478280" y="5048038"/>
-            <a:ext cx="9517837" cy="343112"/>
-          </a:xfrm>
-          <a:prstGeom prst="rect">
-            <a:avLst/>
-          </a:prstGeom>
-        </p:spPr>
-      </p:pic>
-      <p:sp>
-        <p:nvSpPr>
-          <p:cNvPr id="9" name="TextBox 8">
-            <a:extLst>
-              <a:ext uri="{FF2B5EF4-FFF2-40B4-BE49-F238E27FC236}">
-                <a16:creationId xmlns:a16="http://schemas.microsoft.com/office/drawing/2014/main" id="{1633556E-68F2-9723-C725-FB4913D0DC62}"/>
-              </a:ext>
-            </a:extLst>
-          </p:cNvPr>
-          <p:cNvSpPr txBox="1"/>
-          <p:nvPr/>
-        </p:nvSpPr>
-        <p:spPr>
-          <a:xfrm>
-            <a:off x="9464539" y="4434840"/>
-            <a:ext cx="1866401" cy="430887"/>
-          </a:xfrm>
-          <a:prstGeom prst="rect">
-            <a:avLst/>
-          </a:prstGeom>
-          <a:noFill/>
-          <a:ln>
-            <a:solidFill>
-              <a:schemeClr val="bg1">
-                <a:lumMod val="85000"/>
-              </a:schemeClr>
-            </a:solidFill>
-          </a:ln>
-        </p:spPr>
-        <p:txBody>
-          <a:bodyPr wrap="square" rtlCol="0">
-            <a:spAutoFit/>
-          </a:bodyPr>
-          <a:lstStyle/>
-          <a:p>
-            <a:pPr algn="ctr"/>
-            <a:r>
-              <a:rPr lang="en-US" sz="1100">
-                <a:solidFill>
-                  <a:schemeClr val="accent2">
-                    <a:lumMod val="60000"/>
-                    <a:lumOff val="40000"/>
-                  </a:schemeClr>
-                </a:solidFill>
-              </a:rPr>
-              <a:t>[harga ambil data dari tb gedung]</a:t>
-            </a:r>
-          </a:p>
-        </p:txBody>
-      </p:sp>
-    </p:spTree>
-    <p:extLst>
-      <p:ext uri="{BB962C8B-B14F-4D97-AF65-F5344CB8AC3E}">
-        <p14:creationId xmlns:p14="http://schemas.microsoft.com/office/powerpoint/2010/main" val="560037392"/>
-      </p:ext>
-    </p:extLst>
-  </p:cSld>
-  <p:clrMapOvr>
-    <a:masterClrMapping/>
-  </p:clrMapOvr>
-</p:sld>
-</file>
-
-<file path=ppt/slides/slide2.xml><?xml version="1.0" encoding="utf-8"?>
+<file path=ppt/slides/slide4.xml><?xml version="1.0" encoding="utf-8"?>
 <p:sld xmlns:a="http://schemas.openxmlformats.org/drawingml/2006/main" xmlns:r="http://schemas.openxmlformats.org/officeDocument/2006/relationships" xmlns:p="http://schemas.openxmlformats.org/presentationml/2006/main">
   <p:cSld>
     <p:spTree>
@@ -5854,7 +7972,7 @@
 </p:sld>
 </file>
 
-<file path=ppt/slides/slide3.xml><?xml version="1.0" encoding="utf-8"?>
+<file path=ppt/slides/slide5.xml><?xml version="1.0" encoding="utf-8"?>
 <p:sld xmlns:a="http://schemas.openxmlformats.org/drawingml/2006/main" xmlns:r="http://schemas.openxmlformats.org/officeDocument/2006/relationships" xmlns:p="http://schemas.openxmlformats.org/presentationml/2006/main">
   <p:cSld>
     <p:spTree>
@@ -6067,7 +8185,7 @@
 </p:sld>
 </file>
 
-<file path=ppt/slides/slide4.xml><?xml version="1.0" encoding="utf-8"?>
+<file path=ppt/slides/slide6.xml><?xml version="1.0" encoding="utf-8"?>
 <p:sld xmlns:a="http://schemas.openxmlformats.org/drawingml/2006/main" xmlns:r="http://schemas.openxmlformats.org/officeDocument/2006/relationships" xmlns:p="http://schemas.openxmlformats.org/presentationml/2006/main">
   <p:cSld>
     <p:spTree>
@@ -6238,7 +8356,7 @@
 </p:sld>
 </file>
 
-<file path=ppt/slides/slide5.xml><?xml version="1.0" encoding="utf-8"?>
+<file path=ppt/slides/slide7.xml><?xml version="1.0" encoding="utf-8"?>
 <p:sld xmlns:a="http://schemas.openxmlformats.org/drawingml/2006/main" xmlns:r="http://schemas.openxmlformats.org/officeDocument/2006/relationships" xmlns:p="http://schemas.openxmlformats.org/presentationml/2006/main">
   <p:cSld>
     <p:spTree>
@@ -6426,7 +8544,7 @@
 </p:sld>
 </file>
 
-<file path=ppt/slides/slide6.xml><?xml version="1.0" encoding="utf-8"?>
+<file path=ppt/slides/slide8.xml><?xml version="1.0" encoding="utf-8"?>
 <p:sld xmlns:a="http://schemas.openxmlformats.org/drawingml/2006/main" xmlns:r="http://schemas.openxmlformats.org/officeDocument/2006/relationships" xmlns:p="http://schemas.openxmlformats.org/presentationml/2006/main">
   <p:cSld>
     <p:spTree>
@@ -6533,7 +8651,7 @@
 </p:sld>
 </file>
 
-<file path=ppt/slides/slide7.xml><?xml version="1.0" encoding="utf-8"?>
+<file path=ppt/slides/slide9.xml><?xml version="1.0" encoding="utf-8"?>
 <p:sld xmlns:a="http://schemas.openxmlformats.org/drawingml/2006/main" xmlns:r="http://schemas.openxmlformats.org/officeDocument/2006/relationships" xmlns:p="http://schemas.openxmlformats.org/presentationml/2006/main">
   <p:cSld>
     <p:spTree>
@@ -6650,288 +8768,6 @@
     <p:extLst>
       <p:ext uri="{BB962C8B-B14F-4D97-AF65-F5344CB8AC3E}">
         <p14:creationId xmlns:p14="http://schemas.microsoft.com/office/powerpoint/2010/main" val="2740473774"/>
-      </p:ext>
-    </p:extLst>
-  </p:cSld>
-  <p:clrMapOvr>
-    <a:masterClrMapping/>
-  </p:clrMapOvr>
-</p:sld>
-</file>
-
-<file path=ppt/slides/slide8.xml><?xml version="1.0" encoding="utf-8"?>
-<p:sld xmlns:a="http://schemas.openxmlformats.org/drawingml/2006/main" xmlns:r="http://schemas.openxmlformats.org/officeDocument/2006/relationships" xmlns:p="http://schemas.openxmlformats.org/presentationml/2006/main">
-  <p:cSld>
-    <p:spTree>
-      <p:nvGrpSpPr>
-        <p:cNvPr id="1" name="">
-          <a:extLst>
-            <a:ext uri="{FF2B5EF4-FFF2-40B4-BE49-F238E27FC236}">
-              <a16:creationId xmlns:a16="http://schemas.microsoft.com/office/drawing/2014/main" id="{163110F5-6F6D-413E-FC99-133EC870DC5D}"/>
-            </a:ext>
-          </a:extLst>
-        </p:cNvPr>
-        <p:cNvGrpSpPr/>
-        <p:nvPr/>
-      </p:nvGrpSpPr>
-      <p:grpSpPr>
-        <a:xfrm>
-          <a:off x="0" y="0"/>
-          <a:ext cx="0" cy="0"/>
-          <a:chOff x="0" y="0"/>
-          <a:chExt cx="0" cy="0"/>
-        </a:xfrm>
-      </p:grpSpPr>
-      <p:pic>
-        <p:nvPicPr>
-          <p:cNvPr id="3" name="Picture 2">
-            <a:extLst>
-              <a:ext uri="{FF2B5EF4-FFF2-40B4-BE49-F238E27FC236}">
-                <a16:creationId xmlns:a16="http://schemas.microsoft.com/office/drawing/2014/main" id="{B5E4C823-3076-E737-BD9C-9E1E0250C209}"/>
-              </a:ext>
-            </a:extLst>
-          </p:cNvPr>
-          <p:cNvPicPr>
-            <a:picLocks noChangeAspect="1"/>
-          </p:cNvPicPr>
-          <p:nvPr/>
-        </p:nvPicPr>
-        <p:blipFill>
-          <a:blip r:embed="rId2"/>
-          <a:stretch>
-            <a:fillRect/>
-          </a:stretch>
-        </p:blipFill>
-        <p:spPr>
-          <a:xfrm>
-            <a:off x="1834557" y="3690948"/>
-            <a:ext cx="7399788" cy="3028507"/>
-          </a:xfrm>
-          <a:prstGeom prst="rect">
-            <a:avLst/>
-          </a:prstGeom>
-        </p:spPr>
-      </p:pic>
-      <p:pic>
-        <p:nvPicPr>
-          <p:cNvPr id="7" name="Picture 6">
-            <a:extLst>
-              <a:ext uri="{FF2B5EF4-FFF2-40B4-BE49-F238E27FC236}">
-                <a16:creationId xmlns:a16="http://schemas.microsoft.com/office/drawing/2014/main" id="{04718C61-7734-8584-62FE-27EAA79A2988}"/>
-              </a:ext>
-            </a:extLst>
-          </p:cNvPr>
-          <p:cNvPicPr>
-            <a:picLocks noChangeAspect="1"/>
-          </p:cNvPicPr>
-          <p:nvPr/>
-        </p:nvPicPr>
-        <p:blipFill>
-          <a:blip r:embed="rId3"/>
-          <a:stretch>
-            <a:fillRect/>
-          </a:stretch>
-        </p:blipFill>
-        <p:spPr>
-          <a:xfrm>
-            <a:off x="1834557" y="138545"/>
-            <a:ext cx="7161661" cy="3018961"/>
-          </a:xfrm>
-          <a:prstGeom prst="rect">
-            <a:avLst/>
-          </a:prstGeom>
-        </p:spPr>
-      </p:pic>
-    </p:spTree>
-    <p:extLst>
-      <p:ext uri="{BB962C8B-B14F-4D97-AF65-F5344CB8AC3E}">
-        <p14:creationId xmlns:p14="http://schemas.microsoft.com/office/powerpoint/2010/main" val="3691796962"/>
-      </p:ext>
-    </p:extLst>
-  </p:cSld>
-  <p:clrMapOvr>
-    <a:masterClrMapping/>
-  </p:clrMapOvr>
-</p:sld>
-</file>
-
-<file path=ppt/slides/slide9.xml><?xml version="1.0" encoding="utf-8"?>
-<p:sld xmlns:a="http://schemas.openxmlformats.org/drawingml/2006/main" xmlns:r="http://schemas.openxmlformats.org/officeDocument/2006/relationships" xmlns:p="http://schemas.openxmlformats.org/presentationml/2006/main">
-  <p:cSld>
-    <p:spTree>
-      <p:nvGrpSpPr>
-        <p:cNvPr id="1" name="">
-          <a:extLst>
-            <a:ext uri="{FF2B5EF4-FFF2-40B4-BE49-F238E27FC236}">
-              <a16:creationId xmlns:a16="http://schemas.microsoft.com/office/drawing/2014/main" id="{163110F5-6F6D-413E-FC99-133EC870DC5D}"/>
-            </a:ext>
-          </a:extLst>
-        </p:cNvPr>
-        <p:cNvGrpSpPr/>
-        <p:nvPr/>
-      </p:nvGrpSpPr>
-      <p:grpSpPr>
-        <a:xfrm>
-          <a:off x="0" y="0"/>
-          <a:ext cx="0" cy="0"/>
-          <a:chOff x="0" y="0"/>
-          <a:chExt cx="0" cy="0"/>
-        </a:xfrm>
-      </p:grpSpPr>
-      <p:pic>
-        <p:nvPicPr>
-          <p:cNvPr id="3" name="Picture 2">
-            <a:extLst>
-              <a:ext uri="{FF2B5EF4-FFF2-40B4-BE49-F238E27FC236}">
-                <a16:creationId xmlns:a16="http://schemas.microsoft.com/office/drawing/2014/main" id="{06022873-A011-166D-D2A3-D51EE18559D6}"/>
-              </a:ext>
-            </a:extLst>
-          </p:cNvPr>
-          <p:cNvPicPr>
-            <a:picLocks noChangeAspect="1"/>
-          </p:cNvPicPr>
-          <p:nvPr/>
-        </p:nvPicPr>
-        <p:blipFill>
-          <a:blip r:embed="rId2"/>
-          <a:stretch>
-            <a:fillRect/>
-          </a:stretch>
-        </p:blipFill>
-        <p:spPr>
-          <a:xfrm>
-            <a:off x="254000" y="693111"/>
-            <a:ext cx="11684000" cy="5471777"/>
-          </a:xfrm>
-          <a:prstGeom prst="rect">
-            <a:avLst/>
-          </a:prstGeom>
-        </p:spPr>
-      </p:pic>
-      <p:pic>
-        <p:nvPicPr>
-          <p:cNvPr id="6" name="Picture 5">
-            <a:extLst>
-              <a:ext uri="{FF2B5EF4-FFF2-40B4-BE49-F238E27FC236}">
-                <a16:creationId xmlns:a16="http://schemas.microsoft.com/office/drawing/2014/main" id="{E4E6C63D-00BA-A154-51DF-A2628EB3C1DA}"/>
-              </a:ext>
-            </a:extLst>
-          </p:cNvPr>
-          <p:cNvPicPr>
-            <a:picLocks noChangeAspect="1"/>
-          </p:cNvPicPr>
-          <p:nvPr/>
-        </p:nvPicPr>
-        <p:blipFill>
-          <a:blip r:embed="rId3"/>
-          <a:stretch>
-            <a:fillRect/>
-          </a:stretch>
-        </p:blipFill>
-        <p:spPr>
-          <a:xfrm>
-            <a:off x="377352" y="1773382"/>
-            <a:ext cx="11482139" cy="411145"/>
-          </a:xfrm>
-          <a:prstGeom prst="rect">
-            <a:avLst/>
-          </a:prstGeom>
-        </p:spPr>
-      </p:pic>
-      <p:pic>
-        <p:nvPicPr>
-          <p:cNvPr id="9" name="Picture 8">
-            <a:extLst>
-              <a:ext uri="{FF2B5EF4-FFF2-40B4-BE49-F238E27FC236}">
-                <a16:creationId xmlns:a16="http://schemas.microsoft.com/office/drawing/2014/main" id="{F49B66EA-38B3-0D99-6F07-12B1C6CFE25A}"/>
-              </a:ext>
-            </a:extLst>
-          </p:cNvPr>
-          <p:cNvPicPr>
-            <a:picLocks noChangeAspect="1"/>
-          </p:cNvPicPr>
-          <p:nvPr/>
-        </p:nvPicPr>
-        <p:blipFill>
-          <a:blip r:embed="rId4"/>
-          <a:stretch>
-            <a:fillRect/>
-          </a:stretch>
-        </p:blipFill>
-        <p:spPr>
-          <a:xfrm>
-            <a:off x="377352" y="1819655"/>
-            <a:ext cx="3418793" cy="318597"/>
-          </a:xfrm>
-          <a:prstGeom prst="rect">
-            <a:avLst/>
-          </a:prstGeom>
-        </p:spPr>
-      </p:pic>
-      <p:pic>
-        <p:nvPicPr>
-          <p:cNvPr id="13" name="Picture 12">
-            <a:extLst>
-              <a:ext uri="{FF2B5EF4-FFF2-40B4-BE49-F238E27FC236}">
-                <a16:creationId xmlns:a16="http://schemas.microsoft.com/office/drawing/2014/main" id="{69E1D7C4-37B8-1B09-D6D6-18ACC6E39440}"/>
-              </a:ext>
-            </a:extLst>
-          </p:cNvPr>
-          <p:cNvPicPr>
-            <a:picLocks noChangeAspect="1"/>
-          </p:cNvPicPr>
-          <p:nvPr/>
-        </p:nvPicPr>
-        <p:blipFill>
-          <a:blip r:embed="rId5"/>
-          <a:stretch>
-            <a:fillRect/>
-          </a:stretch>
-        </p:blipFill>
-        <p:spPr>
-          <a:xfrm>
-            <a:off x="5158957" y="1818919"/>
-            <a:ext cx="1918927" cy="320068"/>
-          </a:xfrm>
-          <a:prstGeom prst="rect">
-            <a:avLst/>
-          </a:prstGeom>
-        </p:spPr>
-      </p:pic>
-      <p:pic>
-        <p:nvPicPr>
-          <p:cNvPr id="15" name="Picture 14">
-            <a:extLst>
-              <a:ext uri="{FF2B5EF4-FFF2-40B4-BE49-F238E27FC236}">
-                <a16:creationId xmlns:a16="http://schemas.microsoft.com/office/drawing/2014/main" id="{6B85C64C-053B-C22C-249D-25A5FEEC375D}"/>
-              </a:ext>
-            </a:extLst>
-          </p:cNvPr>
-          <p:cNvPicPr>
-            <a:picLocks noChangeAspect="1"/>
-          </p:cNvPicPr>
-          <p:nvPr/>
-        </p:nvPicPr>
-        <p:blipFill>
-          <a:blip r:embed="rId6"/>
-          <a:stretch>
-            <a:fillRect/>
-          </a:stretch>
-        </p:blipFill>
-        <p:spPr>
-          <a:xfrm>
-            <a:off x="8922327" y="1792746"/>
-            <a:ext cx="2892321" cy="413984"/>
-          </a:xfrm>
-          <a:prstGeom prst="rect">
-            <a:avLst/>
-          </a:prstGeom>
-        </p:spPr>
-      </p:pic>
-    </p:spTree>
-    <p:extLst>
-      <p:ext uri="{BB962C8B-B14F-4D97-AF65-F5344CB8AC3E}">
-        <p14:creationId xmlns:p14="http://schemas.microsoft.com/office/powerpoint/2010/main" val="1654078093"/>
       </p:ext>
     </p:extLst>
   </p:cSld>

</xml_diff>